<commit_message>
passes all tests indicated in pptx
</commit_message>
<xml_diff>
--- a/TicketWeb.pptx
+++ b/TicketWeb.pptx
@@ -14,8 +14,7 @@
     <p:sldId id="262" r:id="rId8"/>
     <p:sldId id="263" r:id="rId9"/>
     <p:sldId id="264" r:id="rId10"/>
-    <p:sldId id="265" r:id="rId11"/>
-    <p:sldId id="266" r:id="rId12"/>
+    <p:sldId id="266" r:id="rId11"/>
   </p:sldIdLst>
   <p:sldSz cx="12192000" cy="6858000"/>
   <p:notesSz cx="6858000" cy="9144000"/>
@@ -114,6 +113,11 @@
       </a:defRPr>
     </a:lvl9pPr>
   </p:defaultTextStyle>
+  <p:extLst>
+    <p:ext uri="{EFAFB233-063F-42B5-8137-9DF3F51BA10A}">
+      <p15:sldGuideLst xmlns:p15="http://schemas.microsoft.com/office/powerpoint/2012/main"/>
+    </p:ext>
+  </p:extLst>
 </p:presentation>
 </file>
 
@@ -266,7 +270,7 @@
           <a:p>
             <a:fld id="{15B0556B-328C-46FD-815F-50BB9A8B982A}" type="datetimeFigureOut">
               <a:rPr lang="en-GB" smtClean="0"/>
-              <a:t>12/09/2021</a:t>
+              <a:t>13/09/2021</a:t>
             </a:fld>
             <a:endParaRPr lang="en-GB"/>
           </a:p>
@@ -466,7 +470,7 @@
           <a:p>
             <a:fld id="{15B0556B-328C-46FD-815F-50BB9A8B982A}" type="datetimeFigureOut">
               <a:rPr lang="en-GB" smtClean="0"/>
-              <a:t>12/09/2021</a:t>
+              <a:t>13/09/2021</a:t>
             </a:fld>
             <a:endParaRPr lang="en-GB"/>
           </a:p>
@@ -676,7 +680,7 @@
           <a:p>
             <a:fld id="{15B0556B-328C-46FD-815F-50BB9A8B982A}" type="datetimeFigureOut">
               <a:rPr lang="en-GB" smtClean="0"/>
-              <a:t>12/09/2021</a:t>
+              <a:t>13/09/2021</a:t>
             </a:fld>
             <a:endParaRPr lang="en-GB"/>
           </a:p>
@@ -876,7 +880,7 @@
           <a:p>
             <a:fld id="{15B0556B-328C-46FD-815F-50BB9A8B982A}" type="datetimeFigureOut">
               <a:rPr lang="en-GB" smtClean="0"/>
-              <a:t>12/09/2021</a:t>
+              <a:t>13/09/2021</a:t>
             </a:fld>
             <a:endParaRPr lang="en-GB"/>
           </a:p>
@@ -1152,7 +1156,7 @@
           <a:p>
             <a:fld id="{15B0556B-328C-46FD-815F-50BB9A8B982A}" type="datetimeFigureOut">
               <a:rPr lang="en-GB" smtClean="0"/>
-              <a:t>12/09/2021</a:t>
+              <a:t>13/09/2021</a:t>
             </a:fld>
             <a:endParaRPr lang="en-GB"/>
           </a:p>
@@ -1420,7 +1424,7 @@
           <a:p>
             <a:fld id="{15B0556B-328C-46FD-815F-50BB9A8B982A}" type="datetimeFigureOut">
               <a:rPr lang="en-GB" smtClean="0"/>
-              <a:t>12/09/2021</a:t>
+              <a:t>13/09/2021</a:t>
             </a:fld>
             <a:endParaRPr lang="en-GB"/>
           </a:p>
@@ -1835,7 +1839,7 @@
           <a:p>
             <a:fld id="{15B0556B-328C-46FD-815F-50BB9A8B982A}" type="datetimeFigureOut">
               <a:rPr lang="en-GB" smtClean="0"/>
-              <a:t>12/09/2021</a:t>
+              <a:t>13/09/2021</a:t>
             </a:fld>
             <a:endParaRPr lang="en-GB"/>
           </a:p>
@@ -1977,7 +1981,7 @@
           <a:p>
             <a:fld id="{15B0556B-328C-46FD-815F-50BB9A8B982A}" type="datetimeFigureOut">
               <a:rPr lang="en-GB" smtClean="0"/>
-              <a:t>12/09/2021</a:t>
+              <a:t>13/09/2021</a:t>
             </a:fld>
             <a:endParaRPr lang="en-GB"/>
           </a:p>
@@ -2090,7 +2094,7 @@
           <a:p>
             <a:fld id="{15B0556B-328C-46FD-815F-50BB9A8B982A}" type="datetimeFigureOut">
               <a:rPr lang="en-GB" smtClean="0"/>
-              <a:t>12/09/2021</a:t>
+              <a:t>13/09/2021</a:t>
             </a:fld>
             <a:endParaRPr lang="en-GB"/>
           </a:p>
@@ -2403,7 +2407,7 @@
           <a:p>
             <a:fld id="{15B0556B-328C-46FD-815F-50BB9A8B982A}" type="datetimeFigureOut">
               <a:rPr lang="en-GB" smtClean="0"/>
-              <a:t>12/09/2021</a:t>
+              <a:t>13/09/2021</a:t>
             </a:fld>
             <a:endParaRPr lang="en-GB"/>
           </a:p>
@@ -2692,7 +2696,7 @@
           <a:p>
             <a:fld id="{15B0556B-328C-46FD-815F-50BB9A8B982A}" type="datetimeFigureOut">
               <a:rPr lang="en-GB" smtClean="0"/>
-              <a:t>12/09/2021</a:t>
+              <a:t>13/09/2021</a:t>
             </a:fld>
             <a:endParaRPr lang="en-GB"/>
           </a:p>
@@ -2935,7 +2939,7 @@
           <a:p>
             <a:fld id="{15B0556B-328C-46FD-815F-50BB9A8B982A}" type="datetimeFigureOut">
               <a:rPr lang="en-GB" smtClean="0"/>
-              <a:t>12/09/2021</a:t>
+              <a:t>13/09/2021</a:t>
             </a:fld>
             <a:endParaRPr lang="en-GB"/>
           </a:p>
@@ -3441,7 +3445,7 @@
           <p:cNvPr id="2" name="Title 1">
             <a:extLst>
               <a:ext uri="{FF2B5EF4-FFF2-40B4-BE49-F238E27FC236}">
-                <a16:creationId xmlns:a16="http://schemas.microsoft.com/office/drawing/2014/main" id="{E4CBB9EF-7A86-403A-AB43-BA518F2B5BE9}"/>
+                <a16:creationId xmlns:a16="http://schemas.microsoft.com/office/drawing/2014/main" id="{0656F7D2-2A05-4049-8191-90F5EB421FB2}"/>
               </a:ext>
             </a:extLst>
           </p:cNvPr>
@@ -3459,167 +3463,352 @@
           <a:p>
             <a:r>
               <a:rPr lang="en-US" dirty="0"/>
-              <a:t>Test Cases – User has paid</a:t>
+              <a:t>Test Cases – User Payment</a:t>
             </a:r>
             <a:endParaRPr lang="en-GB" dirty="0"/>
           </a:p>
         </p:txBody>
       </p:sp>
-      <p:sp>
-        <p:nvSpPr>
-          <p:cNvPr id="3" name="Content Placeholder 2">
-            <a:extLst>
-              <a:ext uri="{FF2B5EF4-FFF2-40B4-BE49-F238E27FC236}">
-                <a16:creationId xmlns:a16="http://schemas.microsoft.com/office/drawing/2014/main" id="{E0EFE73A-218B-48C0-B006-3583565DBBEC}"/>
-              </a:ext>
-            </a:extLst>
-          </p:cNvPr>
-          <p:cNvSpPr>
-            <a:spLocks noGrp="1"/>
-          </p:cNvSpPr>
-          <p:nvPr>
-            <p:ph idx="1"/>
-          </p:nvPr>
-        </p:nvSpPr>
-        <p:spPr/>
-        <p:txBody>
-          <a:bodyPr/>
-          <a:lstStyle/>
-          <a:p>
-            <a:r>
-              <a:rPr lang="en-US" dirty="0"/>
-              <a:t>Test that the user has access to all the pages including the selection of a ticket.</a:t>
-            </a:r>
-          </a:p>
-        </p:txBody>
-      </p:sp>
-    </p:spTree>
-    <p:extLst>
-      <p:ext uri="{BB962C8B-B14F-4D97-AF65-F5344CB8AC3E}">
-        <p14:creationId xmlns:p14="http://schemas.microsoft.com/office/powerpoint/2010/main" val="652162847"/>
-      </p:ext>
-    </p:extLst>
-  </p:cSld>
-  <p:clrMapOvr>
-    <a:masterClrMapping/>
-  </p:clrMapOvr>
-</p:sld>
-</file>
-
-<file path=ppt/slides/slide11.xml><?xml version="1.0" encoding="utf-8"?>
-<p:sld xmlns:a="http://schemas.openxmlformats.org/drawingml/2006/main" xmlns:r="http://schemas.openxmlformats.org/officeDocument/2006/relationships" xmlns:p="http://schemas.openxmlformats.org/presentationml/2006/main">
-  <p:cSld>
-    <p:spTree>
-      <p:nvGrpSpPr>
-        <p:cNvPr id="1" name=""/>
-        <p:cNvGrpSpPr/>
-        <p:nvPr/>
-      </p:nvGrpSpPr>
-      <p:grpSpPr>
-        <a:xfrm>
-          <a:off x="0" y="0"/>
-          <a:ext cx="0" cy="0"/>
-          <a:chOff x="0" y="0"/>
-          <a:chExt cx="0" cy="0"/>
-        </a:xfrm>
-      </p:grpSpPr>
-      <p:sp>
-        <p:nvSpPr>
-          <p:cNvPr id="2" name="Title 1">
-            <a:extLst>
-              <a:ext uri="{FF2B5EF4-FFF2-40B4-BE49-F238E27FC236}">
-                <a16:creationId xmlns:a16="http://schemas.microsoft.com/office/drawing/2014/main" id="{0656F7D2-2A05-4049-8191-90F5EB421FB2}"/>
-              </a:ext>
-            </a:extLst>
-          </p:cNvPr>
-          <p:cNvSpPr>
-            <a:spLocks noGrp="1"/>
-          </p:cNvSpPr>
-          <p:nvPr>
-            <p:ph type="title"/>
-          </p:nvPr>
-        </p:nvSpPr>
-        <p:spPr/>
-        <p:txBody>
-          <a:bodyPr/>
-          <a:lstStyle/>
-          <a:p>
-            <a:r>
-              <a:rPr lang="en-US" dirty="0"/>
-              <a:t>Test Cases – User Payment</a:t>
-            </a:r>
-            <a:endParaRPr lang="en-GB" dirty="0"/>
-          </a:p>
-        </p:txBody>
-      </p:sp>
-      <p:sp>
-        <p:nvSpPr>
-          <p:cNvPr id="3" name="Content Placeholder 2">
-            <a:extLst>
-              <a:ext uri="{FF2B5EF4-FFF2-40B4-BE49-F238E27FC236}">
-                <a16:creationId xmlns:a16="http://schemas.microsoft.com/office/drawing/2014/main" id="{D8B14684-FC8D-4887-9ABD-9E80D1BCC31A}"/>
-              </a:ext>
-            </a:extLst>
-          </p:cNvPr>
-          <p:cNvSpPr>
-            <a:spLocks noGrp="1"/>
-          </p:cNvSpPr>
-          <p:nvPr>
-            <p:ph idx="1"/>
-          </p:nvPr>
-        </p:nvSpPr>
-        <p:spPr/>
-        <p:txBody>
-          <a:bodyPr>
-            <a:normAutofit fontScale="92500" lnSpcReduction="10000"/>
-          </a:bodyPr>
-          <a:lstStyle/>
-          <a:p>
-            <a:r>
-              <a:rPr lang="en-US" dirty="0"/>
-              <a:t>Test that for a user who has not paid, the month shown is the current and the price is correct.</a:t>
-            </a:r>
-          </a:p>
-          <a:p>
-            <a:r>
-              <a:rPr lang="en-US" dirty="0"/>
-              <a:t>Test that for a user who has paid and it is more than 5 days before the end of the month, the month shown is the current and the amount is 0.</a:t>
-            </a:r>
-          </a:p>
-          <a:p>
-            <a:r>
-              <a:rPr lang="en-US" dirty="0"/>
-              <a:t>Test that for a user who has paid for the current month but not the next month and it is less than 5 days before the end of the month, the month shown is the next month and the amount is correct.</a:t>
-            </a:r>
-          </a:p>
-          <a:p>
-            <a:r>
-              <a:rPr lang="en-US" dirty="0"/>
-              <a:t>Test that for a user who has paid for the current month and the next month and it is less than 5 days before the end of the month, the month shown is the next month and the amount 0.</a:t>
-            </a:r>
-          </a:p>
-          <a:p>
-            <a:r>
-              <a:rPr lang="en-US" dirty="0"/>
-              <a:t>Allow a user to change their </a:t>
-            </a:r>
-            <a:r>
-              <a:rPr lang="en-US" dirty="0" err="1"/>
-              <a:t>btc</a:t>
-            </a:r>
-            <a:r>
-              <a:rPr lang="en-US" dirty="0"/>
-              <a:t> wallet address.</a:t>
-            </a:r>
-          </a:p>
-          <a:p>
-            <a:endParaRPr lang="en-US" dirty="0"/>
-          </a:p>
-          <a:p>
-            <a:endParaRPr lang="en-GB" dirty="0"/>
-          </a:p>
-        </p:txBody>
-      </p:sp>
+      <p:graphicFrame>
+        <p:nvGraphicFramePr>
+          <p:cNvPr id="4" name="Table 4">
+            <a:extLst>
+              <a:ext uri="{FF2B5EF4-FFF2-40B4-BE49-F238E27FC236}">
+                <a16:creationId xmlns:a16="http://schemas.microsoft.com/office/drawing/2014/main" id="{02EFB62F-10B2-4A24-8FCA-06E1FE5DE7C3}"/>
+              </a:ext>
+            </a:extLst>
+          </p:cNvPr>
+          <p:cNvGraphicFramePr>
+            <a:graphicFrameLocks noGrp="1"/>
+          </p:cNvGraphicFramePr>
+          <p:nvPr>
+            <p:extLst>
+              <p:ext uri="{D42A27DB-BD31-4B8C-83A1-F6EECF244321}">
+                <p14:modId xmlns:p14="http://schemas.microsoft.com/office/powerpoint/2010/main" val="3376803377"/>
+              </p:ext>
+            </p:extLst>
+          </p:nvPr>
+        </p:nvGraphicFramePr>
+        <p:xfrm>
+          <a:off x="223921" y="1492167"/>
+          <a:ext cx="11607008" cy="2641781"/>
+        </p:xfrm>
+        <a:graphic>
+          <a:graphicData uri="http://schemas.openxmlformats.org/drawingml/2006/table">
+            <a:tbl>
+              <a:tblPr firstRow="1" bandRow="1">
+                <a:tableStyleId>{073A0DAA-6AF3-43AB-8588-CEC1D06C72B9}</a:tableStyleId>
+              </a:tblPr>
+              <a:tblGrid>
+                <a:gridCol w="5803504">
+                  <a:extLst>
+                    <a:ext uri="{9D8B030D-6E8A-4147-A177-3AD203B41FA5}">
+                      <a16:colId xmlns:a16="http://schemas.microsoft.com/office/drawing/2014/main" val="3474174491"/>
+                    </a:ext>
+                  </a:extLst>
+                </a:gridCol>
+                <a:gridCol w="5803504">
+                  <a:extLst>
+                    <a:ext uri="{9D8B030D-6E8A-4147-A177-3AD203B41FA5}">
+                      <a16:colId xmlns:a16="http://schemas.microsoft.com/office/drawing/2014/main" val="3802548961"/>
+                    </a:ext>
+                  </a:extLst>
+                </a:gridCol>
+              </a:tblGrid>
+              <a:tr h="370840">
+                <a:tc>
+                  <a:txBody>
+                    <a:bodyPr/>
+                    <a:lstStyle/>
+                    <a:p>
+                      <a:r>
+                        <a:rPr lang="en-US" dirty="0"/>
+                        <a:t>Test Case Description</a:t>
+                      </a:r>
+                      <a:endParaRPr lang="en-GB" dirty="0"/>
+                    </a:p>
+                  </a:txBody>
+                  <a:tcPr/>
+                </a:tc>
+                <a:tc>
+                  <a:txBody>
+                    <a:bodyPr/>
+                    <a:lstStyle/>
+                    <a:p>
+                      <a:r>
+                        <a:rPr lang="en-US" dirty="0"/>
+                        <a:t>Passes</a:t>
+                      </a:r>
+                      <a:endParaRPr lang="en-GB" dirty="0"/>
+                    </a:p>
+                  </a:txBody>
+                  <a:tcPr/>
+                </a:tc>
+                <a:extLst>
+                  <a:ext uri="{0D108BD9-81ED-4DB2-BD59-A6C34878D82A}">
+                    <a16:rowId xmlns:a16="http://schemas.microsoft.com/office/drawing/2014/main" val="2293430474"/>
+                  </a:ext>
+                </a:extLst>
+              </a:tr>
+              <a:tr h="396240">
+                <a:tc>
+                  <a:txBody>
+                    <a:bodyPr/>
+                    <a:lstStyle/>
+                    <a:p>
+                      <a:r>
+                        <a:rPr lang="en-US" sz="1000" dirty="0"/>
+                        <a:t>Test that for a user who has not paid, the month shown is the current and the price is correct.</a:t>
+                      </a:r>
+                    </a:p>
+                  </a:txBody>
+                  <a:tcPr/>
+                </a:tc>
+                <a:tc>
+                  <a:txBody>
+                    <a:bodyPr/>
+                    <a:lstStyle/>
+                    <a:p>
+                      <a:r>
+                        <a:rPr lang="en-US" sz="1000" dirty="0">
+                          <a:solidFill>
+                            <a:schemeClr val="bg1"/>
+                          </a:solidFill>
+                        </a:rPr>
+                        <a:t>Y</a:t>
+                      </a:r>
+                      <a:endParaRPr lang="en-GB" sz="1000" dirty="0">
+                        <a:solidFill>
+                          <a:schemeClr val="bg1"/>
+                        </a:solidFill>
+                      </a:endParaRPr>
+                    </a:p>
+                  </a:txBody>
+                  <a:tcPr>
+                    <a:solidFill>
+                      <a:srgbClr val="00B050"/>
+                    </a:solidFill>
+                  </a:tcPr>
+                </a:tc>
+                <a:extLst>
+                  <a:ext uri="{0D108BD9-81ED-4DB2-BD59-A6C34878D82A}">
+                    <a16:rowId xmlns:a16="http://schemas.microsoft.com/office/drawing/2014/main" val="2533071839"/>
+                  </a:ext>
+                </a:extLst>
+              </a:tr>
+              <a:tr h="396240">
+                <a:tc>
+                  <a:txBody>
+                    <a:bodyPr/>
+                    <a:lstStyle/>
+                    <a:p>
+                      <a:r>
+                        <a:rPr lang="en-US" sz="1000" dirty="0"/>
+                        <a:t>Test that for a user who has paid and it is more than 5 days before the end of the month, the month shown is the current and the amount is 0.</a:t>
+                      </a:r>
+                    </a:p>
+                  </a:txBody>
+                  <a:tcPr/>
+                </a:tc>
+                <a:tc>
+                  <a:txBody>
+                    <a:bodyPr/>
+                    <a:lstStyle/>
+                    <a:p>
+                      <a:r>
+                        <a:rPr lang="en-US" sz="1000" dirty="0">
+                          <a:solidFill>
+                            <a:schemeClr val="bg1"/>
+                          </a:solidFill>
+                        </a:rPr>
+                        <a:t>Y</a:t>
+                      </a:r>
+                      <a:endParaRPr lang="en-GB" sz="1000" dirty="0">
+                        <a:solidFill>
+                          <a:schemeClr val="bg1"/>
+                        </a:solidFill>
+                      </a:endParaRPr>
+                    </a:p>
+                  </a:txBody>
+                  <a:tcPr>
+                    <a:solidFill>
+                      <a:srgbClr val="00B050"/>
+                    </a:solidFill>
+                  </a:tcPr>
+                </a:tc>
+                <a:extLst>
+                  <a:ext uri="{0D108BD9-81ED-4DB2-BD59-A6C34878D82A}">
+                    <a16:rowId xmlns:a16="http://schemas.microsoft.com/office/drawing/2014/main" val="156722502"/>
+                  </a:ext>
+                </a:extLst>
+              </a:tr>
+              <a:tr h="548640">
+                <a:tc>
+                  <a:txBody>
+                    <a:bodyPr/>
+                    <a:lstStyle/>
+                    <a:p>
+                      <a:r>
+                        <a:rPr lang="en-US" sz="1000" dirty="0"/>
+                        <a:t>Test that for a user who has paid for the current month but not the next month and it is less than 5 days before the end of the month, the month shown is the next month and the amount is correct.</a:t>
+                      </a:r>
+                    </a:p>
+                  </a:txBody>
+                  <a:tcPr/>
+                </a:tc>
+                <a:tc>
+                  <a:txBody>
+                    <a:bodyPr/>
+                    <a:lstStyle/>
+                    <a:p>
+                      <a:r>
+                        <a:rPr lang="en-US" sz="1000" dirty="0">
+                          <a:solidFill>
+                            <a:schemeClr val="bg1"/>
+                          </a:solidFill>
+                        </a:rPr>
+                        <a:t>Y</a:t>
+                      </a:r>
+                      <a:endParaRPr lang="en-GB" sz="1000" dirty="0">
+                        <a:solidFill>
+                          <a:schemeClr val="bg1"/>
+                        </a:solidFill>
+                      </a:endParaRPr>
+                    </a:p>
+                  </a:txBody>
+                  <a:tcPr>
+                    <a:solidFill>
+                      <a:srgbClr val="00B050"/>
+                    </a:solidFill>
+                  </a:tcPr>
+                </a:tc>
+                <a:extLst>
+                  <a:ext uri="{0D108BD9-81ED-4DB2-BD59-A6C34878D82A}">
+                    <a16:rowId xmlns:a16="http://schemas.microsoft.com/office/drawing/2014/main" val="2416268952"/>
+                  </a:ext>
+                </a:extLst>
+              </a:tr>
+              <a:tr h="558981">
+                <a:tc>
+                  <a:txBody>
+                    <a:bodyPr/>
+                    <a:lstStyle/>
+                    <a:p>
+                      <a:pPr marL="0" marR="0" lvl="0" indent="0" algn="l" defTabSz="914400" rtl="0" eaLnBrk="1" fontAlgn="auto" latinLnBrk="0" hangingPunct="1">
+                        <a:lnSpc>
+                          <a:spcPct val="100000"/>
+                        </a:lnSpc>
+                        <a:spcBef>
+                          <a:spcPts val="0"/>
+                        </a:spcBef>
+                        <a:spcAft>
+                          <a:spcPts val="0"/>
+                        </a:spcAft>
+                        <a:buClrTx/>
+                        <a:buSzTx/>
+                        <a:buFontTx/>
+                        <a:buNone/>
+                        <a:tabLst/>
+                        <a:defRPr/>
+                      </a:pPr>
+                      <a:r>
+                        <a:rPr lang="en-US" sz="1000" dirty="0"/>
+                        <a:t>Test that for a user who has paid for the current month and the next month and it is less than 5 days before the end of the month, the month shown is the next month and the amount 0.</a:t>
+                      </a:r>
+                    </a:p>
+                  </a:txBody>
+                  <a:tcPr/>
+                </a:tc>
+                <a:tc>
+                  <a:txBody>
+                    <a:bodyPr/>
+                    <a:lstStyle/>
+                    <a:p>
+                      <a:r>
+                        <a:rPr lang="en-US" sz="1000" dirty="0">
+                          <a:solidFill>
+                            <a:schemeClr val="bg1"/>
+                          </a:solidFill>
+                        </a:rPr>
+                        <a:t>Y</a:t>
+                      </a:r>
+                      <a:endParaRPr lang="en-GB" sz="1000" dirty="0">
+                        <a:solidFill>
+                          <a:schemeClr val="bg1"/>
+                        </a:solidFill>
+                      </a:endParaRPr>
+                    </a:p>
+                  </a:txBody>
+                  <a:tcPr>
+                    <a:solidFill>
+                      <a:srgbClr val="00B050"/>
+                    </a:solidFill>
+                  </a:tcPr>
+                </a:tc>
+                <a:extLst>
+                  <a:ext uri="{0D108BD9-81ED-4DB2-BD59-A6C34878D82A}">
+                    <a16:rowId xmlns:a16="http://schemas.microsoft.com/office/drawing/2014/main" val="2192134449"/>
+                  </a:ext>
+                </a:extLst>
+              </a:tr>
+              <a:tr h="370840">
+                <a:tc>
+                  <a:txBody>
+                    <a:bodyPr/>
+                    <a:lstStyle/>
+                    <a:p>
+                      <a:r>
+                        <a:rPr lang="en-US" sz="1000" dirty="0"/>
+                        <a:t>Allow a user to change their </a:t>
+                      </a:r>
+                      <a:r>
+                        <a:rPr lang="en-US" sz="1000" dirty="0" err="1"/>
+                        <a:t>btc</a:t>
+                      </a:r>
+                      <a:r>
+                        <a:rPr lang="en-US" sz="1000" dirty="0"/>
+                        <a:t> wallet address.</a:t>
+                      </a:r>
+                    </a:p>
+                  </a:txBody>
+                  <a:tcPr/>
+                </a:tc>
+                <a:tc>
+                  <a:txBody>
+                    <a:bodyPr/>
+                    <a:lstStyle/>
+                    <a:p>
+                      <a:r>
+                        <a:rPr lang="en-US" sz="1000" dirty="0">
+                          <a:solidFill>
+                            <a:schemeClr val="bg1"/>
+                          </a:solidFill>
+                        </a:rPr>
+                        <a:t>N</a:t>
+                      </a:r>
+                      <a:endParaRPr lang="en-GB" sz="1000" dirty="0">
+                        <a:solidFill>
+                          <a:schemeClr val="bg1"/>
+                        </a:solidFill>
+                      </a:endParaRPr>
+                    </a:p>
+                  </a:txBody>
+                  <a:tcPr>
+                    <a:solidFill>
+                      <a:srgbClr val="C00000"/>
+                    </a:solidFill>
+                  </a:tcPr>
+                </a:tc>
+                <a:extLst>
+                  <a:ext uri="{0D108BD9-81ED-4DB2-BD59-A6C34878D82A}">
+                    <a16:rowId xmlns:a16="http://schemas.microsoft.com/office/drawing/2014/main" val="4092301472"/>
+                  </a:ext>
+                </a:extLst>
+              </a:tr>
+            </a:tbl>
+          </a:graphicData>
+        </a:graphic>
+      </p:graphicFrame>
     </p:spTree>
     <p:extLst>
       <p:ext uri="{BB962C8B-B14F-4D97-AF65-F5344CB8AC3E}">
@@ -4713,7 +4902,12 @@
             <p:ph type="title"/>
           </p:nvPr>
         </p:nvSpPr>
-        <p:spPr/>
+        <p:spPr>
+          <a:xfrm>
+            <a:off x="0" y="2565"/>
+            <a:ext cx="10515600" cy="728955"/>
+          </a:xfrm>
+        </p:spPr>
         <p:txBody>
           <a:bodyPr/>
           <a:lstStyle/>
@@ -4726,80 +4920,935 @@
           </a:p>
         </p:txBody>
       </p:sp>
-      <p:sp>
-        <p:nvSpPr>
-          <p:cNvPr id="3" name="Content Placeholder 2">
-            <a:extLst>
-              <a:ext uri="{FF2B5EF4-FFF2-40B4-BE49-F238E27FC236}">
-                <a16:creationId xmlns:a16="http://schemas.microsoft.com/office/drawing/2014/main" id="{745B81D7-78C5-458C-8015-C22E0BCEED33}"/>
-              </a:ext>
-            </a:extLst>
-          </p:cNvPr>
-          <p:cNvSpPr>
-            <a:spLocks noGrp="1"/>
-          </p:cNvSpPr>
-          <p:nvPr>
-            <p:ph idx="1"/>
-          </p:nvPr>
-        </p:nvSpPr>
-        <p:spPr/>
-        <p:txBody>
-          <a:bodyPr>
-            <a:normAutofit/>
-          </a:bodyPr>
-          <a:lstStyle/>
-          <a:p>
-            <a:pPr marL="514350" indent="-514350">
-              <a:buFont typeface="+mj-lt"/>
-              <a:buAutoNum type="arabicPeriod"/>
-            </a:pPr>
-            <a:r>
-              <a:rPr lang="en-US" dirty="0"/>
-              <a:t>Test the app displays the info page</a:t>
-            </a:r>
-          </a:p>
-          <a:p>
-            <a:pPr marL="514350" indent="-514350">
-              <a:buFont typeface="+mj-lt"/>
-              <a:buAutoNum type="arabicPeriod"/>
-            </a:pPr>
-            <a:r>
-              <a:rPr lang="en-US" dirty="0"/>
-              <a:t>Test the user can sign out</a:t>
-            </a:r>
-          </a:p>
-          <a:p>
-            <a:pPr marL="514350" indent="-514350">
-              <a:buFont typeface="+mj-lt"/>
-              <a:buAutoNum type="arabicPeriod"/>
-            </a:pPr>
-            <a:r>
-              <a:rPr lang="en-US" dirty="0"/>
-              <a:t>Test the user will sign in when they click a navigation button (except the sign out)</a:t>
-            </a:r>
-          </a:p>
-          <a:p>
-            <a:pPr marL="514350" indent="-514350">
-              <a:buFont typeface="+mj-lt"/>
-              <a:buAutoNum type="arabicPeriod"/>
-            </a:pPr>
-            <a:r>
-              <a:rPr lang="en-US" dirty="0"/>
-              <a:t>Test the user will be presented the payment page if they have not paid</a:t>
-            </a:r>
-          </a:p>
-          <a:p>
-            <a:pPr marL="514350" indent="-514350">
-              <a:buFont typeface="+mj-lt"/>
-              <a:buAutoNum type="arabicPeriod"/>
-            </a:pPr>
-            <a:r>
-              <a:rPr lang="en-US" dirty="0"/>
-              <a:t>Test the user will be presented the page they clicked from the navigation button after they have signed in. The exception is if they have not paid (stated in case 4).</a:t>
-            </a:r>
-          </a:p>
-        </p:txBody>
-      </p:sp>
+      <p:graphicFrame>
+        <p:nvGraphicFramePr>
+          <p:cNvPr id="4" name="Table 4">
+            <a:extLst>
+              <a:ext uri="{FF2B5EF4-FFF2-40B4-BE49-F238E27FC236}">
+                <a16:creationId xmlns:a16="http://schemas.microsoft.com/office/drawing/2014/main" id="{ED3F9D63-534C-4FD8-8B41-7B9132BBAB83}"/>
+              </a:ext>
+            </a:extLst>
+          </p:cNvPr>
+          <p:cNvGraphicFramePr>
+            <a:graphicFrameLocks noGrp="1"/>
+          </p:cNvGraphicFramePr>
+          <p:nvPr>
+            <p:extLst>
+              <p:ext uri="{D42A27DB-BD31-4B8C-83A1-F6EECF244321}">
+                <p14:modId xmlns:p14="http://schemas.microsoft.com/office/powerpoint/2010/main" val="3732469604"/>
+              </p:ext>
+            </p:extLst>
+          </p:nvPr>
+        </p:nvGraphicFramePr>
+        <p:xfrm>
+          <a:off x="0" y="731520"/>
+          <a:ext cx="6838061" cy="2214577"/>
+        </p:xfrm>
+        <a:graphic>
+          <a:graphicData uri="http://schemas.openxmlformats.org/drawingml/2006/table">
+            <a:tbl>
+              <a:tblPr firstRow="1" bandRow="1">
+                <a:tableStyleId>{073A0DAA-6AF3-43AB-8588-CEC1D06C72B9}</a:tableStyleId>
+              </a:tblPr>
+              <a:tblGrid>
+                <a:gridCol w="5971408">
+                  <a:extLst>
+                    <a:ext uri="{9D8B030D-6E8A-4147-A177-3AD203B41FA5}">
+                      <a16:colId xmlns:a16="http://schemas.microsoft.com/office/drawing/2014/main" val="3474174491"/>
+                    </a:ext>
+                  </a:extLst>
+                </a:gridCol>
+                <a:gridCol w="866653">
+                  <a:extLst>
+                    <a:ext uri="{9D8B030D-6E8A-4147-A177-3AD203B41FA5}">
+                      <a16:colId xmlns:a16="http://schemas.microsoft.com/office/drawing/2014/main" val="3802548961"/>
+                    </a:ext>
+                  </a:extLst>
+                </a:gridCol>
+              </a:tblGrid>
+              <a:tr h="196224">
+                <a:tc gridSpan="2">
+                  <a:txBody>
+                    <a:bodyPr/>
+                    <a:lstStyle/>
+                    <a:p>
+                      <a:r>
+                        <a:rPr lang="en-US" dirty="0"/>
+                        <a:t>User has Paid &amp; signed in</a:t>
+                      </a:r>
+                      <a:endParaRPr lang="en-GB" dirty="0"/>
+                    </a:p>
+                  </a:txBody>
+                  <a:tcPr/>
+                </a:tc>
+                <a:tc hMerge="1">
+                  <a:txBody>
+                    <a:bodyPr/>
+                    <a:lstStyle/>
+                    <a:p>
+                      <a:endParaRPr lang="en-GB" dirty="0"/>
+                    </a:p>
+                  </a:txBody>
+                  <a:tcPr/>
+                </a:tc>
+                <a:extLst>
+                  <a:ext uri="{0D108BD9-81ED-4DB2-BD59-A6C34878D82A}">
+                    <a16:rowId xmlns:a16="http://schemas.microsoft.com/office/drawing/2014/main" val="3611948428"/>
+                  </a:ext>
+                </a:extLst>
+              </a:tr>
+              <a:tr h="196224">
+                <a:tc>
+                  <a:txBody>
+                    <a:bodyPr/>
+                    <a:lstStyle/>
+                    <a:p>
+                      <a:r>
+                        <a:rPr lang="en-US" dirty="0"/>
+                        <a:t>Test Case Description</a:t>
+                      </a:r>
+                      <a:endParaRPr lang="en-GB" dirty="0"/>
+                    </a:p>
+                  </a:txBody>
+                  <a:tcPr/>
+                </a:tc>
+                <a:tc>
+                  <a:txBody>
+                    <a:bodyPr/>
+                    <a:lstStyle/>
+                    <a:p>
+                      <a:r>
+                        <a:rPr lang="en-US" dirty="0"/>
+                        <a:t>Passes</a:t>
+                      </a:r>
+                      <a:endParaRPr lang="en-GB" dirty="0"/>
+                    </a:p>
+                  </a:txBody>
+                  <a:tcPr/>
+                </a:tc>
+                <a:extLst>
+                  <a:ext uri="{0D108BD9-81ED-4DB2-BD59-A6C34878D82A}">
+                    <a16:rowId xmlns:a16="http://schemas.microsoft.com/office/drawing/2014/main" val="2293430474"/>
+                  </a:ext>
+                </a:extLst>
+              </a:tr>
+              <a:tr h="212576">
+                <a:tc>
+                  <a:txBody>
+                    <a:bodyPr/>
+                    <a:lstStyle/>
+                    <a:p>
+                      <a:pPr marL="0" indent="0">
+                        <a:buFont typeface="+mj-lt"/>
+                        <a:buNone/>
+                      </a:pPr>
+                      <a:r>
+                        <a:rPr lang="en-US" sz="1000" dirty="0"/>
+                        <a:t>Test the app displays the info page</a:t>
+                      </a:r>
+                    </a:p>
+                    <a:p>
+                      <a:endParaRPr lang="en-GB" sz="1000" dirty="0"/>
+                    </a:p>
+                  </a:txBody>
+                  <a:tcPr/>
+                </a:tc>
+                <a:tc>
+                  <a:txBody>
+                    <a:bodyPr/>
+                    <a:lstStyle/>
+                    <a:p>
+                      <a:r>
+                        <a:rPr lang="en-US" sz="1000" dirty="0">
+                          <a:solidFill>
+                            <a:schemeClr val="bg1"/>
+                          </a:solidFill>
+                        </a:rPr>
+                        <a:t>Y</a:t>
+                      </a:r>
+                      <a:endParaRPr lang="en-GB" sz="1000" dirty="0">
+                        <a:solidFill>
+                          <a:schemeClr val="bg1"/>
+                        </a:solidFill>
+                      </a:endParaRPr>
+                    </a:p>
+                  </a:txBody>
+                  <a:tcPr>
+                    <a:solidFill>
+                      <a:srgbClr val="00B050"/>
+                    </a:solidFill>
+                  </a:tcPr>
+                </a:tc>
+                <a:extLst>
+                  <a:ext uri="{0D108BD9-81ED-4DB2-BD59-A6C34878D82A}">
+                    <a16:rowId xmlns:a16="http://schemas.microsoft.com/office/drawing/2014/main" val="4092301472"/>
+                  </a:ext>
+                </a:extLst>
+              </a:tr>
+              <a:tr h="212576">
+                <a:tc>
+                  <a:txBody>
+                    <a:bodyPr/>
+                    <a:lstStyle/>
+                    <a:p>
+                      <a:pPr marL="0" indent="0">
+                        <a:buFont typeface="+mj-lt"/>
+                        <a:buNone/>
+                      </a:pPr>
+                      <a:r>
+                        <a:rPr lang="en-US" sz="1000" dirty="0"/>
+                        <a:t>Test the user can sign out</a:t>
+                      </a:r>
+                    </a:p>
+                    <a:p>
+                      <a:endParaRPr lang="en-GB" sz="1000" dirty="0"/>
+                    </a:p>
+                  </a:txBody>
+                  <a:tcPr/>
+                </a:tc>
+                <a:tc>
+                  <a:txBody>
+                    <a:bodyPr/>
+                    <a:lstStyle/>
+                    <a:p>
+                      <a:r>
+                        <a:rPr lang="en-US" sz="1000" dirty="0">
+                          <a:solidFill>
+                            <a:schemeClr val="bg1"/>
+                          </a:solidFill>
+                        </a:rPr>
+                        <a:t>Y</a:t>
+                      </a:r>
+                      <a:endParaRPr lang="en-GB" sz="1000" dirty="0">
+                        <a:solidFill>
+                          <a:schemeClr val="bg1"/>
+                        </a:solidFill>
+                      </a:endParaRPr>
+                    </a:p>
+                  </a:txBody>
+                  <a:tcPr>
+                    <a:solidFill>
+                      <a:srgbClr val="00B050"/>
+                    </a:solidFill>
+                  </a:tcPr>
+                </a:tc>
+                <a:extLst>
+                  <a:ext uri="{0D108BD9-81ED-4DB2-BD59-A6C34878D82A}">
+                    <a16:rowId xmlns:a16="http://schemas.microsoft.com/office/drawing/2014/main" val="328919621"/>
+                  </a:ext>
+                </a:extLst>
+              </a:tr>
+              <a:tr h="212576">
+                <a:tc>
+                  <a:txBody>
+                    <a:bodyPr/>
+                    <a:lstStyle/>
+                    <a:p>
+                      <a:pPr marL="0" indent="0">
+                        <a:buFont typeface="+mj-lt"/>
+                        <a:buNone/>
+                      </a:pPr>
+                      <a:r>
+                        <a:rPr lang="en-US" sz="1000" dirty="0"/>
+                        <a:t>Test the user will sign in when they click a navigation button (except the sign out)</a:t>
+                      </a:r>
+                    </a:p>
+                    <a:p>
+                      <a:endParaRPr lang="en-GB" sz="1000" dirty="0"/>
+                    </a:p>
+                  </a:txBody>
+                  <a:tcPr/>
+                </a:tc>
+                <a:tc>
+                  <a:txBody>
+                    <a:bodyPr/>
+                    <a:lstStyle/>
+                    <a:p>
+                      <a:r>
+                        <a:rPr lang="en-US" sz="1000" dirty="0">
+                          <a:solidFill>
+                            <a:schemeClr val="bg1"/>
+                          </a:solidFill>
+                        </a:rPr>
+                        <a:t>Y</a:t>
+                      </a:r>
+                      <a:endParaRPr lang="en-GB" sz="1000" dirty="0">
+                        <a:solidFill>
+                          <a:schemeClr val="bg1"/>
+                        </a:solidFill>
+                      </a:endParaRPr>
+                    </a:p>
+                  </a:txBody>
+                  <a:tcPr>
+                    <a:solidFill>
+                      <a:srgbClr val="00B050"/>
+                    </a:solidFill>
+                  </a:tcPr>
+                </a:tc>
+                <a:extLst>
+                  <a:ext uri="{0D108BD9-81ED-4DB2-BD59-A6C34878D82A}">
+                    <a16:rowId xmlns:a16="http://schemas.microsoft.com/office/drawing/2014/main" val="966653664"/>
+                  </a:ext>
+                </a:extLst>
+              </a:tr>
+              <a:tr h="294337">
+                <a:tc>
+                  <a:txBody>
+                    <a:bodyPr/>
+                    <a:lstStyle/>
+                    <a:p>
+                      <a:pPr marL="0" indent="0">
+                        <a:buFont typeface="+mj-lt"/>
+                        <a:buNone/>
+                      </a:pPr>
+                      <a:r>
+                        <a:rPr lang="en-US" sz="1000" dirty="0"/>
+                        <a:t>Test the user will be presented the page they clicked from the navigation button after they have signed in. </a:t>
+                      </a:r>
+                      <a:endParaRPr lang="en-GB" sz="1000" dirty="0"/>
+                    </a:p>
+                  </a:txBody>
+                  <a:tcPr/>
+                </a:tc>
+                <a:tc>
+                  <a:txBody>
+                    <a:bodyPr/>
+                    <a:lstStyle/>
+                    <a:p>
+                      <a:r>
+                        <a:rPr lang="en-US" sz="1000" dirty="0">
+                          <a:solidFill>
+                            <a:schemeClr val="bg1"/>
+                          </a:solidFill>
+                        </a:rPr>
+                        <a:t>Y</a:t>
+                      </a:r>
+                      <a:endParaRPr lang="en-GB" sz="1000" dirty="0">
+                        <a:solidFill>
+                          <a:schemeClr val="bg1"/>
+                        </a:solidFill>
+                      </a:endParaRPr>
+                    </a:p>
+                  </a:txBody>
+                  <a:tcPr>
+                    <a:solidFill>
+                      <a:srgbClr val="00B050"/>
+                    </a:solidFill>
+                  </a:tcPr>
+                </a:tc>
+                <a:extLst>
+                  <a:ext uri="{0D108BD9-81ED-4DB2-BD59-A6C34878D82A}">
+                    <a16:rowId xmlns:a16="http://schemas.microsoft.com/office/drawing/2014/main" val="2481358409"/>
+                  </a:ext>
+                </a:extLst>
+              </a:tr>
+            </a:tbl>
+          </a:graphicData>
+        </a:graphic>
+      </p:graphicFrame>
+      <p:graphicFrame>
+        <p:nvGraphicFramePr>
+          <p:cNvPr id="7" name="Table 4">
+            <a:extLst>
+              <a:ext uri="{FF2B5EF4-FFF2-40B4-BE49-F238E27FC236}">
+                <a16:creationId xmlns:a16="http://schemas.microsoft.com/office/drawing/2014/main" id="{5575E71B-33E3-4A9E-977C-C6309C187317}"/>
+              </a:ext>
+            </a:extLst>
+          </p:cNvPr>
+          <p:cNvGraphicFramePr>
+            <a:graphicFrameLocks noGrp="1"/>
+          </p:cNvGraphicFramePr>
+          <p:nvPr>
+            <p:extLst>
+              <p:ext uri="{D42A27DB-BD31-4B8C-83A1-F6EECF244321}">
+                <p14:modId xmlns:p14="http://schemas.microsoft.com/office/powerpoint/2010/main" val="404830324"/>
+              </p:ext>
+            </p:extLst>
+          </p:nvPr>
+        </p:nvGraphicFramePr>
+        <p:xfrm>
+          <a:off x="0" y="3261360"/>
+          <a:ext cx="6838061" cy="2316480"/>
+        </p:xfrm>
+        <a:graphic>
+          <a:graphicData uri="http://schemas.openxmlformats.org/drawingml/2006/table">
+            <a:tbl>
+              <a:tblPr firstRow="1" bandRow="1">
+                <a:tableStyleId>{073A0DAA-6AF3-43AB-8588-CEC1D06C72B9}</a:tableStyleId>
+              </a:tblPr>
+              <a:tblGrid>
+                <a:gridCol w="5971408">
+                  <a:extLst>
+                    <a:ext uri="{9D8B030D-6E8A-4147-A177-3AD203B41FA5}">
+                      <a16:colId xmlns:a16="http://schemas.microsoft.com/office/drawing/2014/main" val="3474174491"/>
+                    </a:ext>
+                  </a:extLst>
+                </a:gridCol>
+                <a:gridCol w="866653">
+                  <a:extLst>
+                    <a:ext uri="{9D8B030D-6E8A-4147-A177-3AD203B41FA5}">
+                      <a16:colId xmlns:a16="http://schemas.microsoft.com/office/drawing/2014/main" val="3802548961"/>
+                    </a:ext>
+                  </a:extLst>
+                </a:gridCol>
+              </a:tblGrid>
+              <a:tr h="196224">
+                <a:tc gridSpan="2">
+                  <a:txBody>
+                    <a:bodyPr/>
+                    <a:lstStyle/>
+                    <a:p>
+                      <a:r>
+                        <a:rPr lang="en-US" dirty="0"/>
+                        <a:t>User has not paid &amp; signed in</a:t>
+                      </a:r>
+                      <a:endParaRPr lang="en-GB" dirty="0"/>
+                    </a:p>
+                  </a:txBody>
+                  <a:tcPr/>
+                </a:tc>
+                <a:tc hMerge="1">
+                  <a:txBody>
+                    <a:bodyPr/>
+                    <a:lstStyle/>
+                    <a:p>
+                      <a:endParaRPr lang="en-GB" dirty="0"/>
+                    </a:p>
+                  </a:txBody>
+                  <a:tcPr/>
+                </a:tc>
+                <a:extLst>
+                  <a:ext uri="{0D108BD9-81ED-4DB2-BD59-A6C34878D82A}">
+                    <a16:rowId xmlns:a16="http://schemas.microsoft.com/office/drawing/2014/main" val="3611948428"/>
+                  </a:ext>
+                </a:extLst>
+              </a:tr>
+              <a:tr h="196224">
+                <a:tc>
+                  <a:txBody>
+                    <a:bodyPr/>
+                    <a:lstStyle/>
+                    <a:p>
+                      <a:r>
+                        <a:rPr lang="en-US" dirty="0"/>
+                        <a:t>Test Case Description</a:t>
+                      </a:r>
+                      <a:endParaRPr lang="en-GB" dirty="0"/>
+                    </a:p>
+                  </a:txBody>
+                  <a:tcPr/>
+                </a:tc>
+                <a:tc>
+                  <a:txBody>
+                    <a:bodyPr/>
+                    <a:lstStyle/>
+                    <a:p>
+                      <a:r>
+                        <a:rPr lang="en-US" dirty="0"/>
+                        <a:t>Passes</a:t>
+                      </a:r>
+                      <a:endParaRPr lang="en-GB" dirty="0"/>
+                    </a:p>
+                  </a:txBody>
+                  <a:tcPr/>
+                </a:tc>
+                <a:extLst>
+                  <a:ext uri="{0D108BD9-81ED-4DB2-BD59-A6C34878D82A}">
+                    <a16:rowId xmlns:a16="http://schemas.microsoft.com/office/drawing/2014/main" val="2293430474"/>
+                  </a:ext>
+                </a:extLst>
+              </a:tr>
+              <a:tr h="212576">
+                <a:tc>
+                  <a:txBody>
+                    <a:bodyPr/>
+                    <a:lstStyle/>
+                    <a:p>
+                      <a:pPr marL="0" indent="0">
+                        <a:buFont typeface="+mj-lt"/>
+                        <a:buNone/>
+                      </a:pPr>
+                      <a:r>
+                        <a:rPr lang="en-US" sz="1000" dirty="0"/>
+                        <a:t>Test the app displays the info page</a:t>
+                      </a:r>
+                    </a:p>
+                    <a:p>
+                      <a:endParaRPr lang="en-GB" sz="1000" dirty="0"/>
+                    </a:p>
+                  </a:txBody>
+                  <a:tcPr/>
+                </a:tc>
+                <a:tc>
+                  <a:txBody>
+                    <a:bodyPr/>
+                    <a:lstStyle/>
+                    <a:p>
+                      <a:r>
+                        <a:rPr lang="en-US" sz="1000" dirty="0">
+                          <a:solidFill>
+                            <a:schemeClr val="bg1"/>
+                          </a:solidFill>
+                        </a:rPr>
+                        <a:t>Y</a:t>
+                      </a:r>
+                      <a:endParaRPr lang="en-GB" sz="1000" dirty="0">
+                        <a:solidFill>
+                          <a:schemeClr val="bg1"/>
+                        </a:solidFill>
+                      </a:endParaRPr>
+                    </a:p>
+                  </a:txBody>
+                  <a:tcPr>
+                    <a:solidFill>
+                      <a:srgbClr val="00B050"/>
+                    </a:solidFill>
+                  </a:tcPr>
+                </a:tc>
+                <a:extLst>
+                  <a:ext uri="{0D108BD9-81ED-4DB2-BD59-A6C34878D82A}">
+                    <a16:rowId xmlns:a16="http://schemas.microsoft.com/office/drawing/2014/main" val="4092301472"/>
+                  </a:ext>
+                </a:extLst>
+              </a:tr>
+              <a:tr h="212576">
+                <a:tc>
+                  <a:txBody>
+                    <a:bodyPr/>
+                    <a:lstStyle/>
+                    <a:p>
+                      <a:pPr marL="0" indent="0">
+                        <a:buFont typeface="+mj-lt"/>
+                        <a:buNone/>
+                      </a:pPr>
+                      <a:r>
+                        <a:rPr lang="en-US" sz="1000" dirty="0"/>
+                        <a:t>Test the user can sign out</a:t>
+                      </a:r>
+                    </a:p>
+                    <a:p>
+                      <a:endParaRPr lang="en-GB" sz="1000" dirty="0"/>
+                    </a:p>
+                  </a:txBody>
+                  <a:tcPr/>
+                </a:tc>
+                <a:tc>
+                  <a:txBody>
+                    <a:bodyPr/>
+                    <a:lstStyle/>
+                    <a:p>
+                      <a:r>
+                        <a:rPr lang="en-US" sz="1000" dirty="0">
+                          <a:solidFill>
+                            <a:schemeClr val="bg1"/>
+                          </a:solidFill>
+                        </a:rPr>
+                        <a:t>Y</a:t>
+                      </a:r>
+                      <a:endParaRPr lang="en-GB" sz="1000" dirty="0">
+                        <a:solidFill>
+                          <a:schemeClr val="bg1"/>
+                        </a:solidFill>
+                      </a:endParaRPr>
+                    </a:p>
+                  </a:txBody>
+                  <a:tcPr>
+                    <a:solidFill>
+                      <a:srgbClr val="00B050"/>
+                    </a:solidFill>
+                  </a:tcPr>
+                </a:tc>
+                <a:extLst>
+                  <a:ext uri="{0D108BD9-81ED-4DB2-BD59-A6C34878D82A}">
+                    <a16:rowId xmlns:a16="http://schemas.microsoft.com/office/drawing/2014/main" val="328919621"/>
+                  </a:ext>
+                </a:extLst>
+              </a:tr>
+              <a:tr h="212576">
+                <a:tc>
+                  <a:txBody>
+                    <a:bodyPr/>
+                    <a:lstStyle/>
+                    <a:p>
+                      <a:pPr marL="0" indent="0">
+                        <a:buFont typeface="+mj-lt"/>
+                        <a:buNone/>
+                      </a:pPr>
+                      <a:r>
+                        <a:rPr lang="en-US" sz="1000" dirty="0"/>
+                        <a:t>Test the user will sign in when they click a navigation button (except the sign out)</a:t>
+                      </a:r>
+                    </a:p>
+                    <a:p>
+                      <a:endParaRPr lang="en-GB" sz="1000" dirty="0"/>
+                    </a:p>
+                  </a:txBody>
+                  <a:tcPr/>
+                </a:tc>
+                <a:tc>
+                  <a:txBody>
+                    <a:bodyPr/>
+                    <a:lstStyle/>
+                    <a:p>
+                      <a:r>
+                        <a:rPr lang="en-US" sz="1000" dirty="0">
+                          <a:solidFill>
+                            <a:schemeClr val="bg1"/>
+                          </a:solidFill>
+                        </a:rPr>
+                        <a:t>Y</a:t>
+                      </a:r>
+                      <a:endParaRPr lang="en-GB" sz="1000" dirty="0">
+                        <a:solidFill>
+                          <a:schemeClr val="bg1"/>
+                        </a:solidFill>
+                      </a:endParaRPr>
+                    </a:p>
+                  </a:txBody>
+                  <a:tcPr>
+                    <a:solidFill>
+                      <a:srgbClr val="00B050"/>
+                    </a:solidFill>
+                  </a:tcPr>
+                </a:tc>
+                <a:extLst>
+                  <a:ext uri="{0D108BD9-81ED-4DB2-BD59-A6C34878D82A}">
+                    <a16:rowId xmlns:a16="http://schemas.microsoft.com/office/drawing/2014/main" val="966653664"/>
+                  </a:ext>
+                </a:extLst>
+              </a:tr>
+              <a:tr h="212576">
+                <a:tc>
+                  <a:txBody>
+                    <a:bodyPr/>
+                    <a:lstStyle/>
+                    <a:p>
+                      <a:pPr marL="0" indent="0">
+                        <a:buFont typeface="+mj-lt"/>
+                        <a:buNone/>
+                      </a:pPr>
+                      <a:r>
+                        <a:rPr lang="en-US" sz="1000" dirty="0"/>
+                        <a:t>Test the user will be presented the payment because they have not paid</a:t>
+                      </a:r>
+                    </a:p>
+                    <a:p>
+                      <a:endParaRPr lang="en-GB" sz="1000" dirty="0"/>
+                    </a:p>
+                  </a:txBody>
+                  <a:tcPr/>
+                </a:tc>
+                <a:tc>
+                  <a:txBody>
+                    <a:bodyPr/>
+                    <a:lstStyle/>
+                    <a:p>
+                      <a:r>
+                        <a:rPr lang="en-US" sz="1000" dirty="0">
+                          <a:solidFill>
+                            <a:schemeClr val="bg1"/>
+                          </a:solidFill>
+                        </a:rPr>
+                        <a:t>Y</a:t>
+                      </a:r>
+                      <a:endParaRPr lang="en-GB" sz="1000" dirty="0">
+                        <a:solidFill>
+                          <a:schemeClr val="bg1"/>
+                        </a:solidFill>
+                      </a:endParaRPr>
+                    </a:p>
+                  </a:txBody>
+                  <a:tcPr>
+                    <a:solidFill>
+                      <a:srgbClr val="00B050"/>
+                    </a:solidFill>
+                  </a:tcPr>
+                </a:tc>
+                <a:extLst>
+                  <a:ext uri="{0D108BD9-81ED-4DB2-BD59-A6C34878D82A}">
+                    <a16:rowId xmlns:a16="http://schemas.microsoft.com/office/drawing/2014/main" val="2350835260"/>
+                  </a:ext>
+                </a:extLst>
+              </a:tr>
+            </a:tbl>
+          </a:graphicData>
+        </a:graphic>
+      </p:graphicFrame>
+      <p:graphicFrame>
+        <p:nvGraphicFramePr>
+          <p:cNvPr id="8" name="Table 4">
+            <a:extLst>
+              <a:ext uri="{FF2B5EF4-FFF2-40B4-BE49-F238E27FC236}">
+                <a16:creationId xmlns:a16="http://schemas.microsoft.com/office/drawing/2014/main" id="{2713E33B-78D2-4987-8FC9-324E70A2A6E2}"/>
+              </a:ext>
+            </a:extLst>
+          </p:cNvPr>
+          <p:cNvGraphicFramePr>
+            <a:graphicFrameLocks noGrp="1"/>
+          </p:cNvGraphicFramePr>
+          <p:nvPr>
+            <p:extLst>
+              <p:ext uri="{D42A27DB-BD31-4B8C-83A1-F6EECF244321}">
+                <p14:modId xmlns:p14="http://schemas.microsoft.com/office/powerpoint/2010/main" val="3410242113"/>
+              </p:ext>
+            </p:extLst>
+          </p:nvPr>
+        </p:nvGraphicFramePr>
+        <p:xfrm>
+          <a:off x="7096570" y="731519"/>
+          <a:ext cx="4832834" cy="2310855"/>
+        </p:xfrm>
+        <a:graphic>
+          <a:graphicData uri="http://schemas.openxmlformats.org/drawingml/2006/table">
+            <a:tbl>
+              <a:tblPr firstRow="1" bandRow="1">
+                <a:tableStyleId>{073A0DAA-6AF3-43AB-8588-CEC1D06C72B9}</a:tableStyleId>
+              </a:tblPr>
+              <a:tblGrid>
+                <a:gridCol w="3721485">
+                  <a:extLst>
+                    <a:ext uri="{9D8B030D-6E8A-4147-A177-3AD203B41FA5}">
+                      <a16:colId xmlns:a16="http://schemas.microsoft.com/office/drawing/2014/main" val="3474174491"/>
+                    </a:ext>
+                  </a:extLst>
+                </a:gridCol>
+                <a:gridCol w="1111349">
+                  <a:extLst>
+                    <a:ext uri="{9D8B030D-6E8A-4147-A177-3AD203B41FA5}">
+                      <a16:colId xmlns:a16="http://schemas.microsoft.com/office/drawing/2014/main" val="3802548961"/>
+                    </a:ext>
+                  </a:extLst>
+                </a:gridCol>
+              </a:tblGrid>
+              <a:tr h="345128">
+                <a:tc gridSpan="2">
+                  <a:txBody>
+                    <a:bodyPr/>
+                    <a:lstStyle/>
+                    <a:p>
+                      <a:r>
+                        <a:rPr lang="en-US" dirty="0"/>
+                        <a:t>User is signed out</a:t>
+                      </a:r>
+                      <a:endParaRPr lang="en-GB" dirty="0"/>
+                    </a:p>
+                  </a:txBody>
+                  <a:tcPr/>
+                </a:tc>
+                <a:tc hMerge="1">
+                  <a:txBody>
+                    <a:bodyPr/>
+                    <a:lstStyle/>
+                    <a:p>
+                      <a:endParaRPr lang="en-GB" dirty="0"/>
+                    </a:p>
+                  </a:txBody>
+                  <a:tcPr/>
+                </a:tc>
+                <a:extLst>
+                  <a:ext uri="{0D108BD9-81ED-4DB2-BD59-A6C34878D82A}">
+                    <a16:rowId xmlns:a16="http://schemas.microsoft.com/office/drawing/2014/main" val="3611948428"/>
+                  </a:ext>
+                </a:extLst>
+              </a:tr>
+              <a:tr h="603975">
+                <a:tc>
+                  <a:txBody>
+                    <a:bodyPr/>
+                    <a:lstStyle/>
+                    <a:p>
+                      <a:r>
+                        <a:rPr lang="en-US" dirty="0"/>
+                        <a:t>Test Case Description</a:t>
+                      </a:r>
+                      <a:endParaRPr lang="en-GB" dirty="0"/>
+                    </a:p>
+                  </a:txBody>
+                  <a:tcPr/>
+                </a:tc>
+                <a:tc>
+                  <a:txBody>
+                    <a:bodyPr/>
+                    <a:lstStyle/>
+                    <a:p>
+                      <a:r>
+                        <a:rPr lang="en-US" dirty="0"/>
+                        <a:t>Passes</a:t>
+                      </a:r>
+                      <a:endParaRPr lang="en-GB" dirty="0"/>
+                    </a:p>
+                  </a:txBody>
+                  <a:tcPr/>
+                </a:tc>
+                <a:extLst>
+                  <a:ext uri="{0D108BD9-81ED-4DB2-BD59-A6C34878D82A}">
+                    <a16:rowId xmlns:a16="http://schemas.microsoft.com/office/drawing/2014/main" val="2293430474"/>
+                  </a:ext>
+                </a:extLst>
+              </a:tr>
+              <a:tr h="373890">
+                <a:tc>
+                  <a:txBody>
+                    <a:bodyPr/>
+                    <a:lstStyle/>
+                    <a:p>
+                      <a:pPr marL="0" indent="0">
+                        <a:buFont typeface="+mj-lt"/>
+                        <a:buNone/>
+                      </a:pPr>
+                      <a:r>
+                        <a:rPr lang="en-US" sz="1000" dirty="0"/>
+                        <a:t>Test the app displays the info page</a:t>
+                      </a:r>
+                    </a:p>
+                    <a:p>
+                      <a:endParaRPr lang="en-GB" sz="1000" dirty="0"/>
+                    </a:p>
+                  </a:txBody>
+                  <a:tcPr/>
+                </a:tc>
+                <a:tc>
+                  <a:txBody>
+                    <a:bodyPr/>
+                    <a:lstStyle/>
+                    <a:p>
+                      <a:r>
+                        <a:rPr lang="en-US" sz="1000" dirty="0">
+                          <a:solidFill>
+                            <a:schemeClr val="bg1"/>
+                          </a:solidFill>
+                        </a:rPr>
+                        <a:t>Y</a:t>
+                      </a:r>
+                      <a:endParaRPr lang="en-GB" sz="1000" dirty="0">
+                        <a:solidFill>
+                          <a:schemeClr val="bg1"/>
+                        </a:solidFill>
+                      </a:endParaRPr>
+                    </a:p>
+                  </a:txBody>
+                  <a:tcPr>
+                    <a:solidFill>
+                      <a:srgbClr val="00B050"/>
+                    </a:solidFill>
+                  </a:tcPr>
+                </a:tc>
+                <a:extLst>
+                  <a:ext uri="{0D108BD9-81ED-4DB2-BD59-A6C34878D82A}">
+                    <a16:rowId xmlns:a16="http://schemas.microsoft.com/office/drawing/2014/main" val="4092301472"/>
+                  </a:ext>
+                </a:extLst>
+              </a:tr>
+              <a:tr h="373890">
+                <a:tc>
+                  <a:txBody>
+                    <a:bodyPr/>
+                    <a:lstStyle/>
+                    <a:p>
+                      <a:pPr marL="0" indent="0">
+                        <a:buFont typeface="+mj-lt"/>
+                        <a:buNone/>
+                      </a:pPr>
+                      <a:r>
+                        <a:rPr lang="en-US" sz="1000" dirty="0"/>
+                        <a:t>Test the user can sign out</a:t>
+                      </a:r>
+                    </a:p>
+                    <a:p>
+                      <a:endParaRPr lang="en-GB" sz="1000" dirty="0"/>
+                    </a:p>
+                  </a:txBody>
+                  <a:tcPr/>
+                </a:tc>
+                <a:tc>
+                  <a:txBody>
+                    <a:bodyPr/>
+                    <a:lstStyle/>
+                    <a:p>
+                      <a:r>
+                        <a:rPr lang="en-US" sz="1000" dirty="0">
+                          <a:solidFill>
+                            <a:schemeClr val="bg1"/>
+                          </a:solidFill>
+                        </a:rPr>
+                        <a:t>Y</a:t>
+                      </a:r>
+                      <a:endParaRPr lang="en-GB" sz="1000" dirty="0">
+                        <a:solidFill>
+                          <a:schemeClr val="bg1"/>
+                        </a:solidFill>
+                      </a:endParaRPr>
+                    </a:p>
+                  </a:txBody>
+                  <a:tcPr>
+                    <a:solidFill>
+                      <a:srgbClr val="00B050"/>
+                    </a:solidFill>
+                  </a:tcPr>
+                </a:tc>
+                <a:extLst>
+                  <a:ext uri="{0D108BD9-81ED-4DB2-BD59-A6C34878D82A}">
+                    <a16:rowId xmlns:a16="http://schemas.microsoft.com/office/drawing/2014/main" val="328919621"/>
+                  </a:ext>
+                </a:extLst>
+              </a:tr>
+              <a:tr h="517693">
+                <a:tc>
+                  <a:txBody>
+                    <a:bodyPr/>
+                    <a:lstStyle/>
+                    <a:p>
+                      <a:pPr marL="0" indent="0">
+                        <a:buFont typeface="+mj-lt"/>
+                        <a:buNone/>
+                      </a:pPr>
+                      <a:r>
+                        <a:rPr lang="en-US" sz="1000" dirty="0"/>
+                        <a:t>Test the user will be prompted to sign in when clicking navigation button (except sign out)</a:t>
+                      </a:r>
+                    </a:p>
+                    <a:p>
+                      <a:endParaRPr lang="en-GB" sz="1000" dirty="0"/>
+                    </a:p>
+                  </a:txBody>
+                  <a:tcPr/>
+                </a:tc>
+                <a:tc>
+                  <a:txBody>
+                    <a:bodyPr/>
+                    <a:lstStyle/>
+                    <a:p>
+                      <a:r>
+                        <a:rPr lang="en-US" sz="1000" dirty="0">
+                          <a:solidFill>
+                            <a:schemeClr val="bg1"/>
+                          </a:solidFill>
+                        </a:rPr>
+                        <a:t>Y</a:t>
+                      </a:r>
+                      <a:endParaRPr lang="en-GB" sz="1000" dirty="0">
+                        <a:solidFill>
+                          <a:schemeClr val="bg1"/>
+                        </a:solidFill>
+                      </a:endParaRPr>
+                    </a:p>
+                  </a:txBody>
+                  <a:tcPr>
+                    <a:solidFill>
+                      <a:srgbClr val="00B050"/>
+                    </a:solidFill>
+                  </a:tcPr>
+                </a:tc>
+                <a:extLst>
+                  <a:ext uri="{0D108BD9-81ED-4DB2-BD59-A6C34878D82A}">
+                    <a16:rowId xmlns:a16="http://schemas.microsoft.com/office/drawing/2014/main" val="966653664"/>
+                  </a:ext>
+                </a:extLst>
+              </a:tr>
+            </a:tbl>
+          </a:graphicData>
+        </a:graphic>
+      </p:graphicFrame>
     </p:spTree>
     <p:extLst>
       <p:ext uri="{BB962C8B-B14F-4D97-AF65-F5344CB8AC3E}">
@@ -4859,72 +5908,1060 @@
           </a:p>
         </p:txBody>
       </p:sp>
-      <p:sp>
-        <p:nvSpPr>
-          <p:cNvPr id="3" name="Content Placeholder 2">
-            <a:extLst>
-              <a:ext uri="{FF2B5EF4-FFF2-40B4-BE49-F238E27FC236}">
-                <a16:creationId xmlns:a16="http://schemas.microsoft.com/office/drawing/2014/main" id="{689B4541-DFE7-4856-A563-407AF08298BC}"/>
-              </a:ext>
-            </a:extLst>
-          </p:cNvPr>
-          <p:cNvSpPr>
-            <a:spLocks noGrp="1"/>
-          </p:cNvSpPr>
-          <p:nvPr>
-            <p:ph idx="1"/>
-          </p:nvPr>
-        </p:nvSpPr>
-        <p:spPr/>
-        <p:txBody>
-          <a:bodyPr/>
-          <a:lstStyle/>
-          <a:p>
-            <a:pPr marL="514350" indent="-514350">
-              <a:buFont typeface="+mj-lt"/>
-              <a:buAutoNum type="arabicPeriod"/>
-            </a:pPr>
-            <a:r>
-              <a:rPr lang="en-US" dirty="0"/>
-              <a:t>Test when the user signs in, the app fetches the </a:t>
-            </a:r>
-            <a:r>
-              <a:rPr lang="en-US" dirty="0" err="1"/>
-              <a:t>paymentDetails</a:t>
-            </a:r>
-            <a:r>
-              <a:rPr lang="en-US" dirty="0"/>
-              <a:t>, </a:t>
-            </a:r>
-            <a:r>
-              <a:rPr lang="en-US" dirty="0" err="1"/>
-              <a:t>userDetails</a:t>
-            </a:r>
-            <a:r>
-              <a:rPr lang="en-US" dirty="0"/>
-              <a:t> only once.</a:t>
-            </a:r>
-          </a:p>
-          <a:p>
-            <a:pPr marL="514350" indent="-514350">
-              <a:buFont typeface="+mj-lt"/>
-              <a:buAutoNum type="arabicPeriod"/>
-            </a:pPr>
-            <a:r>
-              <a:rPr lang="en-US" dirty="0"/>
-              <a:t>Test when the user has paid, the code is fetched only once.</a:t>
-            </a:r>
-            <a:endParaRPr lang="en-GB" dirty="0"/>
-          </a:p>
-          <a:p>
-            <a:pPr marL="514350" indent="-514350">
-              <a:buFont typeface="+mj-lt"/>
-              <a:buAutoNum type="arabicPeriod"/>
-            </a:pPr>
-            <a:endParaRPr lang="en-GB" dirty="0"/>
-          </a:p>
-        </p:txBody>
-      </p:sp>
+      <p:graphicFrame>
+        <p:nvGraphicFramePr>
+          <p:cNvPr id="4" name="Table 4">
+            <a:extLst>
+              <a:ext uri="{FF2B5EF4-FFF2-40B4-BE49-F238E27FC236}">
+                <a16:creationId xmlns:a16="http://schemas.microsoft.com/office/drawing/2014/main" id="{9F42E42C-C8BA-44F0-B0B6-909517A27C17}"/>
+              </a:ext>
+            </a:extLst>
+          </p:cNvPr>
+          <p:cNvGraphicFramePr>
+            <a:graphicFrameLocks noGrp="1"/>
+          </p:cNvGraphicFramePr>
+          <p:nvPr>
+            <p:extLst>
+              <p:ext uri="{D42A27DB-BD31-4B8C-83A1-F6EECF244321}">
+                <p14:modId xmlns:p14="http://schemas.microsoft.com/office/powerpoint/2010/main" val="2247311245"/>
+              </p:ext>
+            </p:extLst>
+          </p:nvPr>
+        </p:nvGraphicFramePr>
+        <p:xfrm>
+          <a:off x="167104" y="1548508"/>
+          <a:ext cx="11744157" cy="2689922"/>
+        </p:xfrm>
+        <a:graphic>
+          <a:graphicData uri="http://schemas.openxmlformats.org/drawingml/2006/table">
+            <a:tbl>
+              <a:tblPr firstRow="1" bandRow="1">
+                <a:tableStyleId>{073A0DAA-6AF3-43AB-8588-CEC1D06C72B9}</a:tableStyleId>
+              </a:tblPr>
+              <a:tblGrid>
+                <a:gridCol w="3914719">
+                  <a:extLst>
+                    <a:ext uri="{9D8B030D-6E8A-4147-A177-3AD203B41FA5}">
+                      <a16:colId xmlns:a16="http://schemas.microsoft.com/office/drawing/2014/main" val="3474174491"/>
+                    </a:ext>
+                  </a:extLst>
+                </a:gridCol>
+                <a:gridCol w="3914719">
+                  <a:extLst>
+                    <a:ext uri="{9D8B030D-6E8A-4147-A177-3AD203B41FA5}">
+                      <a16:colId xmlns:a16="http://schemas.microsoft.com/office/drawing/2014/main" val="3802548961"/>
+                    </a:ext>
+                  </a:extLst>
+                </a:gridCol>
+                <a:gridCol w="3914719">
+                  <a:extLst>
+                    <a:ext uri="{9D8B030D-6E8A-4147-A177-3AD203B41FA5}">
+                      <a16:colId xmlns:a16="http://schemas.microsoft.com/office/drawing/2014/main" val="4134458459"/>
+                    </a:ext>
+                  </a:extLst>
+                </a:gridCol>
+              </a:tblGrid>
+              <a:tr h="510174">
+                <a:tc gridSpan="2">
+                  <a:txBody>
+                    <a:bodyPr/>
+                    <a:lstStyle/>
+                    <a:p>
+                      <a:r>
+                        <a:rPr lang="en-US" dirty="0"/>
+                        <a:t>User is signing in after being signed out</a:t>
+                      </a:r>
+                      <a:endParaRPr lang="en-GB" dirty="0"/>
+                    </a:p>
+                  </a:txBody>
+                  <a:tcPr/>
+                </a:tc>
+                <a:tc hMerge="1">
+                  <a:txBody>
+                    <a:bodyPr/>
+                    <a:lstStyle/>
+                    <a:p>
+                      <a:endParaRPr lang="en-GB" dirty="0"/>
+                    </a:p>
+                  </a:txBody>
+                  <a:tcPr/>
+                </a:tc>
+                <a:tc>
+                  <a:txBody>
+                    <a:bodyPr/>
+                    <a:lstStyle/>
+                    <a:p>
+                      <a:endParaRPr lang="en-GB" dirty="0"/>
+                    </a:p>
+                  </a:txBody>
+                  <a:tcPr/>
+                </a:tc>
+                <a:extLst>
+                  <a:ext uri="{0D108BD9-81ED-4DB2-BD59-A6C34878D82A}">
+                    <a16:rowId xmlns:a16="http://schemas.microsoft.com/office/drawing/2014/main" val="3293855215"/>
+                  </a:ext>
+                </a:extLst>
+              </a:tr>
+              <a:tr h="510174">
+                <a:tc>
+                  <a:txBody>
+                    <a:bodyPr/>
+                    <a:lstStyle/>
+                    <a:p>
+                      <a:r>
+                        <a:rPr lang="en-US" dirty="0"/>
+                        <a:t>Test Case Description</a:t>
+                      </a:r>
+                      <a:endParaRPr lang="en-GB" dirty="0"/>
+                    </a:p>
+                  </a:txBody>
+                  <a:tcPr/>
+                </a:tc>
+                <a:tc>
+                  <a:txBody>
+                    <a:bodyPr/>
+                    <a:lstStyle/>
+                    <a:p>
+                      <a:r>
+                        <a:rPr lang="en-US" dirty="0"/>
+                        <a:t>Paid</a:t>
+                      </a:r>
+                      <a:endParaRPr lang="en-GB" dirty="0"/>
+                    </a:p>
+                  </a:txBody>
+                  <a:tcPr/>
+                </a:tc>
+                <a:tc>
+                  <a:txBody>
+                    <a:bodyPr/>
+                    <a:lstStyle/>
+                    <a:p>
+                      <a:r>
+                        <a:rPr lang="en-US" dirty="0"/>
+                        <a:t>Passes</a:t>
+                      </a:r>
+                      <a:endParaRPr lang="en-GB" dirty="0"/>
+                    </a:p>
+                  </a:txBody>
+                  <a:tcPr/>
+                </a:tc>
+                <a:extLst>
+                  <a:ext uri="{0D108BD9-81ED-4DB2-BD59-A6C34878D82A}">
+                    <a16:rowId xmlns:a16="http://schemas.microsoft.com/office/drawing/2014/main" val="2293430474"/>
+                  </a:ext>
+                </a:extLst>
+              </a:tr>
+              <a:tr h="300953">
+                <a:tc rowSpan="2">
+                  <a:txBody>
+                    <a:bodyPr/>
+                    <a:lstStyle/>
+                    <a:p>
+                      <a:pPr marL="0" indent="0">
+                        <a:buFont typeface="+mj-lt"/>
+                        <a:buNone/>
+                      </a:pPr>
+                      <a:r>
+                        <a:rPr lang="en-US" sz="1000" dirty="0"/>
+                        <a:t>Test when the user signs in, the app fetches the </a:t>
+                      </a:r>
+                      <a:r>
+                        <a:rPr lang="en-US" sz="1000" dirty="0" err="1"/>
+                        <a:t>paymentDetails</a:t>
+                      </a:r>
+                      <a:r>
+                        <a:rPr lang="en-US" sz="1000" dirty="0"/>
+                        <a:t>, </a:t>
+                      </a:r>
+                      <a:r>
+                        <a:rPr lang="en-US" sz="1000" dirty="0" err="1"/>
+                        <a:t>userDetails</a:t>
+                      </a:r>
+                      <a:r>
+                        <a:rPr lang="en-US" sz="1000" dirty="0"/>
+                        <a:t> only once.</a:t>
+                      </a:r>
+                    </a:p>
+                  </a:txBody>
+                  <a:tcPr/>
+                </a:tc>
+                <a:tc>
+                  <a:txBody>
+                    <a:bodyPr/>
+                    <a:lstStyle/>
+                    <a:p>
+                      <a:r>
+                        <a:rPr lang="en-US" sz="1000" dirty="0"/>
+                        <a:t>Y</a:t>
+                      </a:r>
+                      <a:endParaRPr lang="en-GB" sz="1000" dirty="0"/>
+                    </a:p>
+                  </a:txBody>
+                  <a:tcPr/>
+                </a:tc>
+                <a:tc>
+                  <a:txBody>
+                    <a:bodyPr/>
+                    <a:lstStyle/>
+                    <a:p>
+                      <a:r>
+                        <a:rPr lang="en-US" sz="1000" dirty="0">
+                          <a:solidFill>
+                            <a:schemeClr val="bg1"/>
+                          </a:solidFill>
+                        </a:rPr>
+                        <a:t>Y</a:t>
+                      </a:r>
+                      <a:endParaRPr lang="en-GB" sz="1000" dirty="0">
+                        <a:solidFill>
+                          <a:schemeClr val="bg1"/>
+                        </a:solidFill>
+                      </a:endParaRPr>
+                    </a:p>
+                  </a:txBody>
+                  <a:tcPr>
+                    <a:solidFill>
+                      <a:srgbClr val="00B050"/>
+                    </a:solidFill>
+                  </a:tcPr>
+                </a:tc>
+                <a:extLst>
+                  <a:ext uri="{0D108BD9-81ED-4DB2-BD59-A6C34878D82A}">
+                    <a16:rowId xmlns:a16="http://schemas.microsoft.com/office/drawing/2014/main" val="4092301472"/>
+                  </a:ext>
+                </a:extLst>
+              </a:tr>
+              <a:tr h="301643">
+                <a:tc vMerge="1">
+                  <a:txBody>
+                    <a:bodyPr/>
+                    <a:lstStyle/>
+                    <a:p>
+                      <a:endParaRPr lang="en-GB"/>
+                    </a:p>
+                  </a:txBody>
+                  <a:tcPr/>
+                </a:tc>
+                <a:tc>
+                  <a:txBody>
+                    <a:bodyPr/>
+                    <a:lstStyle/>
+                    <a:p>
+                      <a:r>
+                        <a:rPr lang="en-US" sz="1000" dirty="0"/>
+                        <a:t>N</a:t>
+                      </a:r>
+                      <a:endParaRPr lang="en-GB" sz="1000" dirty="0"/>
+                    </a:p>
+                  </a:txBody>
+                  <a:tcPr/>
+                </a:tc>
+                <a:tc>
+                  <a:txBody>
+                    <a:bodyPr/>
+                    <a:lstStyle/>
+                    <a:p>
+                      <a:r>
+                        <a:rPr lang="en-US" sz="1000" dirty="0">
+                          <a:solidFill>
+                            <a:schemeClr val="bg1"/>
+                          </a:solidFill>
+                        </a:rPr>
+                        <a:t>Y</a:t>
+                      </a:r>
+                      <a:endParaRPr lang="en-GB" sz="1000" dirty="0">
+                        <a:solidFill>
+                          <a:schemeClr val="bg1"/>
+                        </a:solidFill>
+                      </a:endParaRPr>
+                    </a:p>
+                  </a:txBody>
+                  <a:tcPr>
+                    <a:solidFill>
+                      <a:srgbClr val="00B050"/>
+                    </a:solidFill>
+                  </a:tcPr>
+                </a:tc>
+                <a:extLst>
+                  <a:ext uri="{0D108BD9-81ED-4DB2-BD59-A6C34878D82A}">
+                    <a16:rowId xmlns:a16="http://schemas.microsoft.com/office/drawing/2014/main" val="328919621"/>
+                  </a:ext>
+                </a:extLst>
+              </a:tr>
+              <a:tr h="335458">
+                <a:tc rowSpan="2">
+                  <a:txBody>
+                    <a:bodyPr/>
+                    <a:lstStyle/>
+                    <a:p>
+                      <a:pPr marL="0" indent="0">
+                        <a:buFont typeface="+mj-lt"/>
+                        <a:buNone/>
+                      </a:pPr>
+                      <a:r>
+                        <a:rPr lang="en-US" sz="1000" dirty="0"/>
+                        <a:t>Test the code is fetched once for paid, none for not paid</a:t>
+                      </a:r>
+                      <a:endParaRPr lang="en-GB" sz="1000" dirty="0"/>
+                    </a:p>
+                  </a:txBody>
+                  <a:tcPr/>
+                </a:tc>
+                <a:tc>
+                  <a:txBody>
+                    <a:bodyPr/>
+                    <a:lstStyle/>
+                    <a:p>
+                      <a:r>
+                        <a:rPr lang="en-US" sz="1000" dirty="0"/>
+                        <a:t>Y</a:t>
+                      </a:r>
+                      <a:endParaRPr lang="en-GB" sz="1000" dirty="0"/>
+                    </a:p>
+                  </a:txBody>
+                  <a:tcPr/>
+                </a:tc>
+                <a:tc>
+                  <a:txBody>
+                    <a:bodyPr/>
+                    <a:lstStyle/>
+                    <a:p>
+                      <a:r>
+                        <a:rPr lang="en-US" sz="1000" dirty="0">
+                          <a:solidFill>
+                            <a:schemeClr val="bg1"/>
+                          </a:solidFill>
+                        </a:rPr>
+                        <a:t>Y</a:t>
+                      </a:r>
+                      <a:endParaRPr lang="en-GB" sz="1000" dirty="0">
+                        <a:solidFill>
+                          <a:schemeClr val="bg1"/>
+                        </a:solidFill>
+                      </a:endParaRPr>
+                    </a:p>
+                  </a:txBody>
+                  <a:tcPr>
+                    <a:solidFill>
+                      <a:srgbClr val="00B050"/>
+                    </a:solidFill>
+                  </a:tcPr>
+                </a:tc>
+                <a:extLst>
+                  <a:ext uri="{0D108BD9-81ED-4DB2-BD59-A6C34878D82A}">
+                    <a16:rowId xmlns:a16="http://schemas.microsoft.com/office/drawing/2014/main" val="2979251277"/>
+                  </a:ext>
+                </a:extLst>
+              </a:tr>
+              <a:tr h="0">
+                <a:tc vMerge="1">
+                  <a:txBody>
+                    <a:bodyPr/>
+                    <a:lstStyle/>
+                    <a:p>
+                      <a:endParaRPr lang="en-GB"/>
+                    </a:p>
+                  </a:txBody>
+                  <a:tcPr/>
+                </a:tc>
+                <a:tc>
+                  <a:txBody>
+                    <a:bodyPr/>
+                    <a:lstStyle/>
+                    <a:p>
+                      <a:r>
+                        <a:rPr lang="en-US" sz="1000" dirty="0"/>
+                        <a:t>N</a:t>
+                      </a:r>
+                      <a:endParaRPr lang="en-GB" sz="1000" dirty="0"/>
+                    </a:p>
+                  </a:txBody>
+                  <a:tcPr/>
+                </a:tc>
+                <a:tc>
+                  <a:txBody>
+                    <a:bodyPr/>
+                    <a:lstStyle/>
+                    <a:p>
+                      <a:r>
+                        <a:rPr lang="en-US" sz="1000" dirty="0">
+                          <a:solidFill>
+                            <a:schemeClr val="bg1"/>
+                          </a:solidFill>
+                        </a:rPr>
+                        <a:t>Y</a:t>
+                      </a:r>
+                      <a:endParaRPr lang="en-GB" sz="1000" dirty="0">
+                        <a:solidFill>
+                          <a:schemeClr val="bg1"/>
+                        </a:solidFill>
+                      </a:endParaRPr>
+                    </a:p>
+                  </a:txBody>
+                  <a:tcPr>
+                    <a:solidFill>
+                      <a:srgbClr val="00B050"/>
+                    </a:solidFill>
+                  </a:tcPr>
+                </a:tc>
+                <a:extLst>
+                  <a:ext uri="{0D108BD9-81ED-4DB2-BD59-A6C34878D82A}">
+                    <a16:rowId xmlns:a16="http://schemas.microsoft.com/office/drawing/2014/main" val="3529110015"/>
+                  </a:ext>
+                </a:extLst>
+              </a:tr>
+              <a:tr h="231320">
+                <a:tc rowSpan="2">
+                  <a:txBody>
+                    <a:bodyPr/>
+                    <a:lstStyle/>
+                    <a:p>
+                      <a:r>
+                        <a:rPr lang="en-US" sz="1000" dirty="0"/>
+                        <a:t>The first screen shown is the ticket menu for payers and payment for non-payers</a:t>
+                      </a:r>
+                      <a:endParaRPr lang="en-GB" sz="1000" dirty="0"/>
+                    </a:p>
+                  </a:txBody>
+                  <a:tcPr/>
+                </a:tc>
+                <a:tc>
+                  <a:txBody>
+                    <a:bodyPr/>
+                    <a:lstStyle/>
+                    <a:p>
+                      <a:r>
+                        <a:rPr lang="en-US" sz="1000" dirty="0"/>
+                        <a:t>Y</a:t>
+                      </a:r>
+                      <a:endParaRPr lang="en-GB" sz="1000" dirty="0"/>
+                    </a:p>
+                  </a:txBody>
+                  <a:tcPr/>
+                </a:tc>
+                <a:tc>
+                  <a:txBody>
+                    <a:bodyPr/>
+                    <a:lstStyle/>
+                    <a:p>
+                      <a:r>
+                        <a:rPr lang="en-US" sz="1000" dirty="0">
+                          <a:solidFill>
+                            <a:schemeClr val="bg1"/>
+                          </a:solidFill>
+                        </a:rPr>
+                        <a:t>Y</a:t>
+                      </a:r>
+                      <a:endParaRPr lang="en-GB" sz="1000" dirty="0">
+                        <a:solidFill>
+                          <a:schemeClr val="bg1"/>
+                        </a:solidFill>
+                      </a:endParaRPr>
+                    </a:p>
+                  </a:txBody>
+                  <a:tcPr>
+                    <a:solidFill>
+                      <a:srgbClr val="00B050"/>
+                    </a:solidFill>
+                  </a:tcPr>
+                </a:tc>
+                <a:extLst>
+                  <a:ext uri="{0D108BD9-81ED-4DB2-BD59-A6C34878D82A}">
+                    <a16:rowId xmlns:a16="http://schemas.microsoft.com/office/drawing/2014/main" val="158307323"/>
+                  </a:ext>
+                </a:extLst>
+              </a:tr>
+              <a:tr h="231320">
+                <a:tc vMerge="1">
+                  <a:txBody>
+                    <a:bodyPr/>
+                    <a:lstStyle/>
+                    <a:p>
+                      <a:endParaRPr lang="en-GB"/>
+                    </a:p>
+                  </a:txBody>
+                  <a:tcPr/>
+                </a:tc>
+                <a:tc>
+                  <a:txBody>
+                    <a:bodyPr/>
+                    <a:lstStyle/>
+                    <a:p>
+                      <a:r>
+                        <a:rPr lang="en-US" sz="1000" dirty="0"/>
+                        <a:t>N</a:t>
+                      </a:r>
+                      <a:endParaRPr lang="en-GB" sz="1000" dirty="0"/>
+                    </a:p>
+                  </a:txBody>
+                  <a:tcPr/>
+                </a:tc>
+                <a:tc>
+                  <a:txBody>
+                    <a:bodyPr/>
+                    <a:lstStyle/>
+                    <a:p>
+                      <a:r>
+                        <a:rPr lang="en-US" sz="1000" dirty="0">
+                          <a:solidFill>
+                            <a:schemeClr val="bg1"/>
+                          </a:solidFill>
+                        </a:rPr>
+                        <a:t>Y</a:t>
+                      </a:r>
+                      <a:endParaRPr lang="en-GB" sz="1000" dirty="0">
+                        <a:solidFill>
+                          <a:schemeClr val="bg1"/>
+                        </a:solidFill>
+                      </a:endParaRPr>
+                    </a:p>
+                  </a:txBody>
+                  <a:tcPr>
+                    <a:solidFill>
+                      <a:srgbClr val="00B050"/>
+                    </a:solidFill>
+                  </a:tcPr>
+                </a:tc>
+                <a:extLst>
+                  <a:ext uri="{0D108BD9-81ED-4DB2-BD59-A6C34878D82A}">
+                    <a16:rowId xmlns:a16="http://schemas.microsoft.com/office/drawing/2014/main" val="1941227035"/>
+                  </a:ext>
+                </a:extLst>
+              </a:tr>
+            </a:tbl>
+          </a:graphicData>
+        </a:graphic>
+      </p:graphicFrame>
+      <p:graphicFrame>
+        <p:nvGraphicFramePr>
+          <p:cNvPr id="7" name="Table 4">
+            <a:extLst>
+              <a:ext uri="{FF2B5EF4-FFF2-40B4-BE49-F238E27FC236}">
+                <a16:creationId xmlns:a16="http://schemas.microsoft.com/office/drawing/2014/main" id="{115E810E-3BD1-491C-871B-671745D64E51}"/>
+              </a:ext>
+            </a:extLst>
+          </p:cNvPr>
+          <p:cNvGraphicFramePr>
+            <a:graphicFrameLocks noGrp="1"/>
+          </p:cNvGraphicFramePr>
+          <p:nvPr>
+            <p:extLst>
+              <p:ext uri="{D42A27DB-BD31-4B8C-83A1-F6EECF244321}">
+                <p14:modId xmlns:p14="http://schemas.microsoft.com/office/powerpoint/2010/main" val="801002175"/>
+              </p:ext>
+            </p:extLst>
+          </p:nvPr>
+        </p:nvGraphicFramePr>
+        <p:xfrm>
+          <a:off x="167104" y="4583553"/>
+          <a:ext cx="11744157" cy="2274447"/>
+        </p:xfrm>
+        <a:graphic>
+          <a:graphicData uri="http://schemas.openxmlformats.org/drawingml/2006/table">
+            <a:tbl>
+              <a:tblPr firstRow="1" bandRow="1">
+                <a:tableStyleId>{073A0DAA-6AF3-43AB-8588-CEC1D06C72B9}</a:tableStyleId>
+              </a:tblPr>
+              <a:tblGrid>
+                <a:gridCol w="3914719">
+                  <a:extLst>
+                    <a:ext uri="{9D8B030D-6E8A-4147-A177-3AD203B41FA5}">
+                      <a16:colId xmlns:a16="http://schemas.microsoft.com/office/drawing/2014/main" val="3474174491"/>
+                    </a:ext>
+                  </a:extLst>
+                </a:gridCol>
+                <a:gridCol w="3978965">
+                  <a:extLst>
+                    <a:ext uri="{9D8B030D-6E8A-4147-A177-3AD203B41FA5}">
+                      <a16:colId xmlns:a16="http://schemas.microsoft.com/office/drawing/2014/main" val="3825443868"/>
+                    </a:ext>
+                  </a:extLst>
+                </a:gridCol>
+                <a:gridCol w="3850473">
+                  <a:extLst>
+                    <a:ext uri="{9D8B030D-6E8A-4147-A177-3AD203B41FA5}">
+                      <a16:colId xmlns:a16="http://schemas.microsoft.com/office/drawing/2014/main" val="3802548961"/>
+                    </a:ext>
+                  </a:extLst>
+                </a:gridCol>
+              </a:tblGrid>
+              <a:tr h="379607">
+                <a:tc gridSpan="3">
+                  <a:txBody>
+                    <a:bodyPr/>
+                    <a:lstStyle/>
+                    <a:p>
+                      <a:r>
+                        <a:rPr lang="en-US" dirty="0"/>
+                        <a:t>User is signing in after app start</a:t>
+                      </a:r>
+                      <a:endParaRPr lang="en-GB" dirty="0"/>
+                    </a:p>
+                  </a:txBody>
+                  <a:tcPr/>
+                </a:tc>
+                <a:tc hMerge="1">
+                  <a:txBody>
+                    <a:bodyPr/>
+                    <a:lstStyle/>
+                    <a:p>
+                      <a:endParaRPr lang="en-GB"/>
+                    </a:p>
+                  </a:txBody>
+                  <a:tcPr/>
+                </a:tc>
+                <a:tc hMerge="1">
+                  <a:txBody>
+                    <a:bodyPr/>
+                    <a:lstStyle/>
+                    <a:p>
+                      <a:endParaRPr lang="en-GB" dirty="0"/>
+                    </a:p>
+                  </a:txBody>
+                  <a:tcPr/>
+                </a:tc>
+                <a:extLst>
+                  <a:ext uri="{0D108BD9-81ED-4DB2-BD59-A6C34878D82A}">
+                    <a16:rowId xmlns:a16="http://schemas.microsoft.com/office/drawing/2014/main" val="3293855215"/>
+                  </a:ext>
+                </a:extLst>
+              </a:tr>
+              <a:tr h="370840">
+                <a:tc>
+                  <a:txBody>
+                    <a:bodyPr/>
+                    <a:lstStyle/>
+                    <a:p>
+                      <a:r>
+                        <a:rPr lang="en-US" dirty="0"/>
+                        <a:t>Test Case Description</a:t>
+                      </a:r>
+                      <a:endParaRPr lang="en-GB" dirty="0"/>
+                    </a:p>
+                  </a:txBody>
+                  <a:tcPr/>
+                </a:tc>
+                <a:tc>
+                  <a:txBody>
+                    <a:bodyPr/>
+                    <a:lstStyle/>
+                    <a:p>
+                      <a:r>
+                        <a:rPr lang="en-US" dirty="0"/>
+                        <a:t>Paid</a:t>
+                      </a:r>
+                      <a:endParaRPr lang="en-GB" dirty="0"/>
+                    </a:p>
+                  </a:txBody>
+                  <a:tcPr/>
+                </a:tc>
+                <a:tc>
+                  <a:txBody>
+                    <a:bodyPr/>
+                    <a:lstStyle/>
+                    <a:p>
+                      <a:r>
+                        <a:rPr lang="en-US" dirty="0"/>
+                        <a:t>Passes</a:t>
+                      </a:r>
+                      <a:endParaRPr lang="en-GB" dirty="0"/>
+                    </a:p>
+                  </a:txBody>
+                  <a:tcPr/>
+                </a:tc>
+                <a:extLst>
+                  <a:ext uri="{0D108BD9-81ED-4DB2-BD59-A6C34878D82A}">
+                    <a16:rowId xmlns:a16="http://schemas.microsoft.com/office/drawing/2014/main" val="2293430474"/>
+                  </a:ext>
+                </a:extLst>
+              </a:tr>
+              <a:tr h="274320">
+                <a:tc rowSpan="2">
+                  <a:txBody>
+                    <a:bodyPr/>
+                    <a:lstStyle/>
+                    <a:p>
+                      <a:pPr marL="0" indent="0">
+                        <a:buFont typeface="+mj-lt"/>
+                        <a:buNone/>
+                      </a:pPr>
+                      <a:r>
+                        <a:rPr lang="en-US" sz="1000" dirty="0"/>
+                        <a:t>Test when the user signs in, the app fetches the </a:t>
+                      </a:r>
+                      <a:r>
+                        <a:rPr lang="en-US" sz="1000" dirty="0" err="1"/>
+                        <a:t>paymentDetails</a:t>
+                      </a:r>
+                      <a:r>
+                        <a:rPr lang="en-US" sz="1000" dirty="0"/>
+                        <a:t>, </a:t>
+                      </a:r>
+                      <a:r>
+                        <a:rPr lang="en-US" sz="1000" dirty="0" err="1"/>
+                        <a:t>userDetails</a:t>
+                      </a:r>
+                      <a:r>
+                        <a:rPr lang="en-US" sz="1000" dirty="0"/>
+                        <a:t> only once.</a:t>
+                      </a:r>
+                    </a:p>
+                    <a:p>
+                      <a:endParaRPr lang="en-GB" sz="1000" dirty="0"/>
+                    </a:p>
+                  </a:txBody>
+                  <a:tcPr/>
+                </a:tc>
+                <a:tc>
+                  <a:txBody>
+                    <a:bodyPr/>
+                    <a:lstStyle/>
+                    <a:p>
+                      <a:r>
+                        <a:rPr lang="en-US" sz="1000" dirty="0"/>
+                        <a:t>Y</a:t>
+                      </a:r>
+                      <a:endParaRPr lang="en-GB" sz="1000" dirty="0"/>
+                    </a:p>
+                  </a:txBody>
+                  <a:tcPr/>
+                </a:tc>
+                <a:tc>
+                  <a:txBody>
+                    <a:bodyPr/>
+                    <a:lstStyle/>
+                    <a:p>
+                      <a:r>
+                        <a:rPr lang="en-US" sz="1000" dirty="0">
+                          <a:solidFill>
+                            <a:schemeClr val="bg1"/>
+                          </a:solidFill>
+                        </a:rPr>
+                        <a:t>Y</a:t>
+                      </a:r>
+                      <a:endParaRPr lang="en-GB" sz="1000" dirty="0">
+                        <a:solidFill>
+                          <a:schemeClr val="bg1"/>
+                        </a:solidFill>
+                      </a:endParaRPr>
+                    </a:p>
+                  </a:txBody>
+                  <a:tcPr>
+                    <a:solidFill>
+                      <a:srgbClr val="00B050"/>
+                    </a:solidFill>
+                  </a:tcPr>
+                </a:tc>
+                <a:extLst>
+                  <a:ext uri="{0D108BD9-81ED-4DB2-BD59-A6C34878D82A}">
+                    <a16:rowId xmlns:a16="http://schemas.microsoft.com/office/drawing/2014/main" val="4092301472"/>
+                  </a:ext>
+                </a:extLst>
+              </a:tr>
+              <a:tr h="274320">
+                <a:tc vMerge="1">
+                  <a:txBody>
+                    <a:bodyPr/>
+                    <a:lstStyle/>
+                    <a:p>
+                      <a:endParaRPr lang="en-GB"/>
+                    </a:p>
+                  </a:txBody>
+                  <a:tcPr/>
+                </a:tc>
+                <a:tc>
+                  <a:txBody>
+                    <a:bodyPr/>
+                    <a:lstStyle/>
+                    <a:p>
+                      <a:r>
+                        <a:rPr lang="en-US" sz="1000" dirty="0"/>
+                        <a:t>N</a:t>
+                      </a:r>
+                      <a:endParaRPr lang="en-GB" sz="1000" dirty="0"/>
+                    </a:p>
+                  </a:txBody>
+                  <a:tcPr/>
+                </a:tc>
+                <a:tc>
+                  <a:txBody>
+                    <a:bodyPr/>
+                    <a:lstStyle/>
+                    <a:p>
+                      <a:r>
+                        <a:rPr lang="en-US" sz="1000" dirty="0">
+                          <a:solidFill>
+                            <a:schemeClr val="bg1"/>
+                          </a:solidFill>
+                        </a:rPr>
+                        <a:t>Y</a:t>
+                      </a:r>
+                      <a:endParaRPr lang="en-GB" sz="1000" dirty="0">
+                        <a:solidFill>
+                          <a:schemeClr val="bg1"/>
+                        </a:solidFill>
+                      </a:endParaRPr>
+                    </a:p>
+                  </a:txBody>
+                  <a:tcPr>
+                    <a:solidFill>
+                      <a:srgbClr val="00B050"/>
+                    </a:solidFill>
+                  </a:tcPr>
+                </a:tc>
+                <a:extLst>
+                  <a:ext uri="{0D108BD9-81ED-4DB2-BD59-A6C34878D82A}">
+                    <a16:rowId xmlns:a16="http://schemas.microsoft.com/office/drawing/2014/main" val="3635228993"/>
+                  </a:ext>
+                </a:extLst>
+              </a:tr>
+              <a:tr h="198120">
+                <a:tc rowSpan="2">
+                  <a:txBody>
+                    <a:bodyPr/>
+                    <a:lstStyle/>
+                    <a:p>
+                      <a:pPr marL="0" indent="0">
+                        <a:buFont typeface="+mj-lt"/>
+                        <a:buNone/>
+                      </a:pPr>
+                      <a:r>
+                        <a:rPr lang="en-US" sz="1000" dirty="0"/>
+                        <a:t>Test the code is fetched once for paid, none for not paid</a:t>
+                      </a:r>
+                      <a:endParaRPr lang="en-GB" sz="1000" dirty="0"/>
+                    </a:p>
+                    <a:p>
+                      <a:endParaRPr lang="en-GB" sz="1000" dirty="0"/>
+                    </a:p>
+                  </a:txBody>
+                  <a:tcPr/>
+                </a:tc>
+                <a:tc>
+                  <a:txBody>
+                    <a:bodyPr/>
+                    <a:lstStyle/>
+                    <a:p>
+                      <a:r>
+                        <a:rPr lang="en-US" sz="1000"/>
+                        <a:t>Y</a:t>
+                      </a:r>
+                      <a:endParaRPr lang="en-GB" sz="1000" dirty="0"/>
+                    </a:p>
+                  </a:txBody>
+                  <a:tcPr/>
+                </a:tc>
+                <a:tc>
+                  <a:txBody>
+                    <a:bodyPr/>
+                    <a:lstStyle/>
+                    <a:p>
+                      <a:r>
+                        <a:rPr lang="en-US" sz="1000" dirty="0">
+                          <a:solidFill>
+                            <a:schemeClr val="bg1"/>
+                          </a:solidFill>
+                        </a:rPr>
+                        <a:t>`Y</a:t>
+                      </a:r>
+                      <a:endParaRPr lang="en-GB" sz="1000" dirty="0">
+                        <a:solidFill>
+                          <a:schemeClr val="bg1"/>
+                        </a:solidFill>
+                      </a:endParaRPr>
+                    </a:p>
+                  </a:txBody>
+                  <a:tcPr>
+                    <a:solidFill>
+                      <a:srgbClr val="00B050"/>
+                    </a:solidFill>
+                  </a:tcPr>
+                </a:tc>
+                <a:extLst>
+                  <a:ext uri="{0D108BD9-81ED-4DB2-BD59-A6C34878D82A}">
+                    <a16:rowId xmlns:a16="http://schemas.microsoft.com/office/drawing/2014/main" val="328919621"/>
+                  </a:ext>
+                </a:extLst>
+              </a:tr>
+              <a:tr h="198120">
+                <a:tc vMerge="1">
+                  <a:txBody>
+                    <a:bodyPr/>
+                    <a:lstStyle/>
+                    <a:p>
+                      <a:endParaRPr lang="en-GB"/>
+                    </a:p>
+                  </a:txBody>
+                  <a:tcPr/>
+                </a:tc>
+                <a:tc>
+                  <a:txBody>
+                    <a:bodyPr/>
+                    <a:lstStyle/>
+                    <a:p>
+                      <a:r>
+                        <a:rPr lang="en-US" sz="1000" dirty="0"/>
+                        <a:t>N</a:t>
+                      </a:r>
+                      <a:endParaRPr lang="en-GB" sz="1000" dirty="0"/>
+                    </a:p>
+                  </a:txBody>
+                  <a:tcPr/>
+                </a:tc>
+                <a:tc>
+                  <a:txBody>
+                    <a:bodyPr/>
+                    <a:lstStyle/>
+                    <a:p>
+                      <a:r>
+                        <a:rPr lang="en-US" sz="1000" dirty="0">
+                          <a:solidFill>
+                            <a:schemeClr val="bg1"/>
+                          </a:solidFill>
+                        </a:rPr>
+                        <a:t>Y</a:t>
+                      </a:r>
+                      <a:endParaRPr lang="en-GB" sz="1000" dirty="0">
+                        <a:solidFill>
+                          <a:schemeClr val="bg1"/>
+                        </a:solidFill>
+                      </a:endParaRPr>
+                    </a:p>
+                  </a:txBody>
+                  <a:tcPr>
+                    <a:solidFill>
+                      <a:srgbClr val="00B050"/>
+                    </a:solidFill>
+                  </a:tcPr>
+                </a:tc>
+                <a:extLst>
+                  <a:ext uri="{0D108BD9-81ED-4DB2-BD59-A6C34878D82A}">
+                    <a16:rowId xmlns:a16="http://schemas.microsoft.com/office/drawing/2014/main" val="641104468"/>
+                  </a:ext>
+                </a:extLst>
+              </a:tr>
+              <a:tr h="198120">
+                <a:tc rowSpan="2">
+                  <a:txBody>
+                    <a:bodyPr/>
+                    <a:lstStyle/>
+                    <a:p>
+                      <a:r>
+                        <a:rPr lang="en-US" sz="1000" dirty="0"/>
+                        <a:t>The first screen shown is the one selected for payers and payment for non-payers</a:t>
+                      </a:r>
+                      <a:endParaRPr lang="en-GB" sz="1000" dirty="0"/>
+                    </a:p>
+                  </a:txBody>
+                  <a:tcPr/>
+                </a:tc>
+                <a:tc>
+                  <a:txBody>
+                    <a:bodyPr/>
+                    <a:lstStyle/>
+                    <a:p>
+                      <a:r>
+                        <a:rPr lang="en-US" sz="1000" dirty="0"/>
+                        <a:t>Y</a:t>
+                      </a:r>
+                      <a:endParaRPr lang="en-GB" sz="1000" dirty="0"/>
+                    </a:p>
+                  </a:txBody>
+                  <a:tcPr/>
+                </a:tc>
+                <a:tc>
+                  <a:txBody>
+                    <a:bodyPr/>
+                    <a:lstStyle/>
+                    <a:p>
+                      <a:r>
+                        <a:rPr lang="en-US" sz="1000" dirty="0">
+                          <a:solidFill>
+                            <a:schemeClr val="bg1"/>
+                          </a:solidFill>
+                        </a:rPr>
+                        <a:t>Y</a:t>
+                      </a:r>
+                      <a:endParaRPr lang="en-GB" sz="1000" dirty="0">
+                        <a:solidFill>
+                          <a:schemeClr val="bg1"/>
+                        </a:solidFill>
+                      </a:endParaRPr>
+                    </a:p>
+                  </a:txBody>
+                  <a:tcPr>
+                    <a:solidFill>
+                      <a:srgbClr val="00B050"/>
+                    </a:solidFill>
+                  </a:tcPr>
+                </a:tc>
+                <a:extLst>
+                  <a:ext uri="{0D108BD9-81ED-4DB2-BD59-A6C34878D82A}">
+                    <a16:rowId xmlns:a16="http://schemas.microsoft.com/office/drawing/2014/main" val="2979251277"/>
+                  </a:ext>
+                </a:extLst>
+              </a:tr>
+              <a:tr h="198120">
+                <a:tc vMerge="1">
+                  <a:txBody>
+                    <a:bodyPr/>
+                    <a:lstStyle/>
+                    <a:p>
+                      <a:endParaRPr lang="en-GB"/>
+                    </a:p>
+                  </a:txBody>
+                  <a:tcPr/>
+                </a:tc>
+                <a:tc>
+                  <a:txBody>
+                    <a:bodyPr/>
+                    <a:lstStyle/>
+                    <a:p>
+                      <a:r>
+                        <a:rPr lang="en-US" sz="1000" dirty="0"/>
+                        <a:t>N</a:t>
+                      </a:r>
+                      <a:endParaRPr lang="en-GB" sz="1000" dirty="0"/>
+                    </a:p>
+                  </a:txBody>
+                  <a:tcPr/>
+                </a:tc>
+                <a:tc>
+                  <a:txBody>
+                    <a:bodyPr/>
+                    <a:lstStyle/>
+                    <a:p>
+                      <a:r>
+                        <a:rPr lang="en-US" sz="1000" dirty="0">
+                          <a:solidFill>
+                            <a:schemeClr val="bg1"/>
+                          </a:solidFill>
+                        </a:rPr>
+                        <a:t>Y</a:t>
+                      </a:r>
+                      <a:endParaRPr lang="en-GB" sz="1000" dirty="0">
+                        <a:solidFill>
+                          <a:schemeClr val="bg1"/>
+                        </a:solidFill>
+                      </a:endParaRPr>
+                    </a:p>
+                  </a:txBody>
+                  <a:tcPr>
+                    <a:solidFill>
+                      <a:srgbClr val="00B050"/>
+                    </a:solidFill>
+                  </a:tcPr>
+                </a:tc>
+                <a:extLst>
+                  <a:ext uri="{0D108BD9-81ED-4DB2-BD59-A6C34878D82A}">
+                    <a16:rowId xmlns:a16="http://schemas.microsoft.com/office/drawing/2014/main" val="3107105218"/>
+                  </a:ext>
+                </a:extLst>
+              </a:tr>
+            </a:tbl>
+          </a:graphicData>
+        </a:graphic>
+      </p:graphicFrame>
     </p:spTree>
     <p:extLst>
       <p:ext uri="{BB962C8B-B14F-4D97-AF65-F5344CB8AC3E}">
@@ -5017,6 +7054,281 @@
           </a:p>
         </p:txBody>
       </p:sp>
+      <p:graphicFrame>
+        <p:nvGraphicFramePr>
+          <p:cNvPr id="4" name="Table 4">
+            <a:extLst>
+              <a:ext uri="{FF2B5EF4-FFF2-40B4-BE49-F238E27FC236}">
+                <a16:creationId xmlns:a16="http://schemas.microsoft.com/office/drawing/2014/main" id="{4EB56F43-F60D-40A9-BB13-BF13B5E9A754}"/>
+              </a:ext>
+            </a:extLst>
+          </p:cNvPr>
+          <p:cNvGraphicFramePr>
+            <a:graphicFrameLocks noGrp="1"/>
+          </p:cNvGraphicFramePr>
+          <p:nvPr>
+            <p:extLst>
+              <p:ext uri="{D42A27DB-BD31-4B8C-83A1-F6EECF244321}">
+                <p14:modId xmlns:p14="http://schemas.microsoft.com/office/powerpoint/2010/main" val="2598447788"/>
+              </p:ext>
+            </p:extLst>
+          </p:nvPr>
+        </p:nvGraphicFramePr>
+        <p:xfrm>
+          <a:off x="223921" y="2440181"/>
+          <a:ext cx="11744157" cy="858520"/>
+        </p:xfrm>
+        <a:graphic>
+          <a:graphicData uri="http://schemas.openxmlformats.org/drawingml/2006/table">
+            <a:tbl>
+              <a:tblPr firstRow="1" bandRow="1">
+                <a:tableStyleId>{073A0DAA-6AF3-43AB-8588-CEC1D06C72B9}</a:tableStyleId>
+              </a:tblPr>
+              <a:tblGrid>
+                <a:gridCol w="3914719">
+                  <a:extLst>
+                    <a:ext uri="{9D8B030D-6E8A-4147-A177-3AD203B41FA5}">
+                      <a16:colId xmlns:a16="http://schemas.microsoft.com/office/drawing/2014/main" val="3474174491"/>
+                    </a:ext>
+                  </a:extLst>
+                </a:gridCol>
+                <a:gridCol w="3914719">
+                  <a:extLst>
+                    <a:ext uri="{9D8B030D-6E8A-4147-A177-3AD203B41FA5}">
+                      <a16:colId xmlns:a16="http://schemas.microsoft.com/office/drawing/2014/main" val="1880532505"/>
+                    </a:ext>
+                  </a:extLst>
+                </a:gridCol>
+                <a:gridCol w="3914719">
+                  <a:extLst>
+                    <a:ext uri="{9D8B030D-6E8A-4147-A177-3AD203B41FA5}">
+                      <a16:colId xmlns:a16="http://schemas.microsoft.com/office/drawing/2014/main" val="3802548961"/>
+                    </a:ext>
+                  </a:extLst>
+                </a:gridCol>
+              </a:tblGrid>
+              <a:tr h="370840">
+                <a:tc>
+                  <a:txBody>
+                    <a:bodyPr/>
+                    <a:lstStyle/>
+                    <a:p>
+                      <a:r>
+                        <a:rPr lang="en-US" dirty="0"/>
+                        <a:t>Test Case Description</a:t>
+                      </a:r>
+                      <a:endParaRPr lang="en-GB" dirty="0"/>
+                    </a:p>
+                  </a:txBody>
+                  <a:tcPr/>
+                </a:tc>
+                <a:tc>
+                  <a:txBody>
+                    <a:bodyPr/>
+                    <a:lstStyle/>
+                    <a:p>
+                      <a:r>
+                        <a:rPr lang="en-US" dirty="0"/>
+                        <a:t>Paid</a:t>
+                      </a:r>
+                      <a:endParaRPr lang="en-GB" dirty="0"/>
+                    </a:p>
+                  </a:txBody>
+                  <a:tcPr/>
+                </a:tc>
+                <a:tc>
+                  <a:txBody>
+                    <a:bodyPr/>
+                    <a:lstStyle/>
+                    <a:p>
+                      <a:r>
+                        <a:rPr lang="en-US" dirty="0"/>
+                        <a:t>Passes</a:t>
+                      </a:r>
+                      <a:endParaRPr lang="en-GB" dirty="0"/>
+                    </a:p>
+                  </a:txBody>
+                  <a:tcPr/>
+                </a:tc>
+                <a:extLst>
+                  <a:ext uri="{0D108BD9-81ED-4DB2-BD59-A6C34878D82A}">
+                    <a16:rowId xmlns:a16="http://schemas.microsoft.com/office/drawing/2014/main" val="2293430474"/>
+                  </a:ext>
+                </a:extLst>
+              </a:tr>
+              <a:tr h="211384">
+                <a:tc rowSpan="2">
+                  <a:txBody>
+                    <a:bodyPr/>
+                    <a:lstStyle/>
+                    <a:p>
+                      <a:pPr marL="0" marR="0" lvl="0" indent="0" algn="l" defTabSz="914400" rtl="0" eaLnBrk="1" fontAlgn="auto" latinLnBrk="0" hangingPunct="1">
+                        <a:lnSpc>
+                          <a:spcPct val="100000"/>
+                        </a:lnSpc>
+                        <a:spcBef>
+                          <a:spcPts val="0"/>
+                        </a:spcBef>
+                        <a:spcAft>
+                          <a:spcPts val="0"/>
+                        </a:spcAft>
+                        <a:buClrTx/>
+                        <a:buSzTx/>
+                        <a:buFontTx/>
+                        <a:buNone/>
+                        <a:tabLst/>
+                        <a:defRPr/>
+                      </a:pPr>
+                      <a:r>
+                        <a:rPr lang="en-US" sz="1000" dirty="0"/>
+                        <a:t>When the user signs out they are shown the sign in UI</a:t>
+                      </a:r>
+                      <a:endParaRPr lang="en-GB" sz="1000" dirty="0"/>
+                    </a:p>
+                  </a:txBody>
+                  <a:tcPr/>
+                </a:tc>
+                <a:tc>
+                  <a:txBody>
+                    <a:bodyPr/>
+                    <a:lstStyle/>
+                    <a:p>
+                      <a:pPr marL="0" marR="0" lvl="0" indent="0" algn="l" defTabSz="914400" rtl="0" eaLnBrk="1" fontAlgn="auto" latinLnBrk="0" hangingPunct="1">
+                        <a:lnSpc>
+                          <a:spcPct val="100000"/>
+                        </a:lnSpc>
+                        <a:spcBef>
+                          <a:spcPts val="0"/>
+                        </a:spcBef>
+                        <a:spcAft>
+                          <a:spcPts val="0"/>
+                        </a:spcAft>
+                        <a:buClrTx/>
+                        <a:buSzTx/>
+                        <a:buFontTx/>
+                        <a:buNone/>
+                        <a:tabLst/>
+                        <a:defRPr/>
+                      </a:pPr>
+                      <a:r>
+                        <a:rPr lang="en-US" sz="1000" dirty="0"/>
+                        <a:t>Y</a:t>
+                      </a:r>
+                      <a:endParaRPr lang="en-GB" sz="1000" dirty="0"/>
+                    </a:p>
+                  </a:txBody>
+                  <a:tcPr/>
+                </a:tc>
+                <a:tc>
+                  <a:txBody>
+                    <a:bodyPr/>
+                    <a:lstStyle/>
+                    <a:p>
+                      <a:r>
+                        <a:rPr lang="en-US" sz="1000" dirty="0">
+                          <a:solidFill>
+                            <a:schemeClr val="bg1"/>
+                          </a:solidFill>
+                        </a:rPr>
+                        <a:t>Y</a:t>
+                      </a:r>
+                      <a:endParaRPr lang="en-GB" sz="1000" dirty="0">
+                        <a:solidFill>
+                          <a:schemeClr val="bg1"/>
+                        </a:solidFill>
+                      </a:endParaRPr>
+                    </a:p>
+                  </a:txBody>
+                  <a:tcPr>
+                    <a:solidFill>
+                      <a:srgbClr val="00B050"/>
+                    </a:solidFill>
+                  </a:tcPr>
+                </a:tc>
+                <a:extLst>
+                  <a:ext uri="{0D108BD9-81ED-4DB2-BD59-A6C34878D82A}">
+                    <a16:rowId xmlns:a16="http://schemas.microsoft.com/office/drawing/2014/main" val="4092301472"/>
+                  </a:ext>
+                </a:extLst>
+              </a:tr>
+              <a:tr h="185420">
+                <a:tc vMerge="1">
+                  <a:txBody>
+                    <a:bodyPr/>
+                    <a:lstStyle/>
+                    <a:p>
+                      <a:endParaRPr lang="en-GB"/>
+                    </a:p>
+                  </a:txBody>
+                  <a:tcPr/>
+                </a:tc>
+                <a:tc>
+                  <a:txBody>
+                    <a:bodyPr/>
+                    <a:lstStyle/>
+                    <a:p>
+                      <a:pPr marL="0" marR="0" lvl="0" indent="0" algn="l" defTabSz="914400" rtl="0" eaLnBrk="1" fontAlgn="auto" latinLnBrk="0" hangingPunct="1">
+                        <a:lnSpc>
+                          <a:spcPct val="100000"/>
+                        </a:lnSpc>
+                        <a:spcBef>
+                          <a:spcPts val="0"/>
+                        </a:spcBef>
+                        <a:spcAft>
+                          <a:spcPts val="0"/>
+                        </a:spcAft>
+                        <a:buClrTx/>
+                        <a:buSzTx/>
+                        <a:buFontTx/>
+                        <a:buNone/>
+                        <a:tabLst/>
+                        <a:defRPr/>
+                      </a:pPr>
+                      <a:r>
+                        <a:rPr lang="en-US" sz="1000" dirty="0"/>
+                        <a:t>N</a:t>
+                      </a:r>
+                      <a:endParaRPr lang="en-GB" sz="1000" dirty="0"/>
+                    </a:p>
+                  </a:txBody>
+                  <a:tcPr/>
+                </a:tc>
+                <a:tc>
+                  <a:txBody>
+                    <a:bodyPr/>
+                    <a:lstStyle/>
+                    <a:p>
+                      <a:r>
+                        <a:rPr lang="en-US" sz="1000" dirty="0">
+                          <a:solidFill>
+                            <a:schemeClr val="bg1"/>
+                          </a:solidFill>
+                        </a:rPr>
+                        <a:t>Y</a:t>
+                      </a:r>
+                      <a:endParaRPr lang="en-GB" sz="1000" dirty="0">
+                        <a:solidFill>
+                          <a:schemeClr val="bg1"/>
+                        </a:solidFill>
+                      </a:endParaRPr>
+                    </a:p>
+                  </a:txBody>
+                  <a:tcPr>
+                    <a:solidFill>
+                      <a:srgbClr val="00B050"/>
+                    </a:solidFill>
+                  </a:tcPr>
+                </a:tc>
+                <a:extLst>
+                  <a:ext uri="{0D108BD9-81ED-4DB2-BD59-A6C34878D82A}">
+                    <a16:rowId xmlns:a16="http://schemas.microsoft.com/office/drawing/2014/main" val="4236588173"/>
+                  </a:ext>
+                </a:extLst>
+              </a:tr>
+            </a:tbl>
+          </a:graphicData>
+        </a:graphic>
+      </p:graphicFrame>
     </p:spTree>
     <p:extLst>
       <p:ext uri="{BB962C8B-B14F-4D97-AF65-F5344CB8AC3E}">
@@ -5070,65 +7382,803 @@
           <a:p>
             <a:r>
               <a:rPr lang="en-US" dirty="0"/>
-              <a:t>Test Cases – User has not paid</a:t>
+              <a:t>Test Cases – Navigation between pages</a:t>
             </a:r>
             <a:endParaRPr lang="en-GB" dirty="0"/>
           </a:p>
         </p:txBody>
       </p:sp>
-      <p:sp>
-        <p:nvSpPr>
-          <p:cNvPr id="3" name="Content Placeholder 2">
-            <a:extLst>
-              <a:ext uri="{FF2B5EF4-FFF2-40B4-BE49-F238E27FC236}">
-                <a16:creationId xmlns:a16="http://schemas.microsoft.com/office/drawing/2014/main" id="{58D2CE0A-0CF4-47AF-85CC-8CCFF3888CBF}"/>
-              </a:ext>
-            </a:extLst>
-          </p:cNvPr>
-          <p:cNvSpPr>
-            <a:spLocks noGrp="1"/>
-          </p:cNvSpPr>
-          <p:nvPr>
-            <p:ph idx="1"/>
-          </p:nvPr>
-        </p:nvSpPr>
-        <p:spPr/>
-        <p:txBody>
-          <a:bodyPr/>
-          <a:lstStyle/>
-          <a:p>
-            <a:r>
-              <a:rPr lang="en-US" dirty="0"/>
-              <a:t>Test that the user still has access to the info page</a:t>
-            </a:r>
-          </a:p>
-          <a:p>
-            <a:r>
-              <a:rPr lang="en-US" dirty="0"/>
-              <a:t>Test that the user still has access to the payment page</a:t>
-            </a:r>
-          </a:p>
-          <a:p>
-            <a:r>
-              <a:rPr lang="en-US" dirty="0"/>
-              <a:t>Test that the user does not have access to the ticket menu</a:t>
-            </a:r>
-          </a:p>
-          <a:p>
-            <a:r>
-              <a:rPr lang="en-US" dirty="0"/>
-              <a:t>Test that the user does not have access to display a ticket</a:t>
-            </a:r>
-          </a:p>
-          <a:p>
-            <a:r>
-              <a:rPr lang="en-US" dirty="0"/>
-              <a:t>Test that the code was not fetched</a:t>
-            </a:r>
-            <a:endParaRPr lang="en-GB" dirty="0"/>
-          </a:p>
-        </p:txBody>
-      </p:sp>
+      <p:graphicFrame>
+        <p:nvGraphicFramePr>
+          <p:cNvPr id="4" name="Table 4">
+            <a:extLst>
+              <a:ext uri="{FF2B5EF4-FFF2-40B4-BE49-F238E27FC236}">
+                <a16:creationId xmlns:a16="http://schemas.microsoft.com/office/drawing/2014/main" id="{1ADDBC14-5F80-459D-92B2-27ACF32BB9B4}"/>
+              </a:ext>
+            </a:extLst>
+          </p:cNvPr>
+          <p:cNvGraphicFramePr>
+            <a:graphicFrameLocks noGrp="1"/>
+          </p:cNvGraphicFramePr>
+          <p:nvPr>
+            <p:extLst>
+              <p:ext uri="{D42A27DB-BD31-4B8C-83A1-F6EECF244321}">
+                <p14:modId xmlns:p14="http://schemas.microsoft.com/office/powerpoint/2010/main" val="2298323212"/>
+              </p:ext>
+            </p:extLst>
+          </p:nvPr>
+        </p:nvGraphicFramePr>
+        <p:xfrm>
+          <a:off x="203200" y="1597971"/>
+          <a:ext cx="11744157" cy="2992120"/>
+        </p:xfrm>
+        <a:graphic>
+          <a:graphicData uri="http://schemas.openxmlformats.org/drawingml/2006/table">
+            <a:tbl>
+              <a:tblPr firstRow="1" bandRow="1">
+                <a:tableStyleId>{073A0DAA-6AF3-43AB-8588-CEC1D06C72B9}</a:tableStyleId>
+              </a:tblPr>
+              <a:tblGrid>
+                <a:gridCol w="3914719">
+                  <a:extLst>
+                    <a:ext uri="{9D8B030D-6E8A-4147-A177-3AD203B41FA5}">
+                      <a16:colId xmlns:a16="http://schemas.microsoft.com/office/drawing/2014/main" val="3474174491"/>
+                    </a:ext>
+                  </a:extLst>
+                </a:gridCol>
+                <a:gridCol w="3914719">
+                  <a:extLst>
+                    <a:ext uri="{9D8B030D-6E8A-4147-A177-3AD203B41FA5}">
+                      <a16:colId xmlns:a16="http://schemas.microsoft.com/office/drawing/2014/main" val="3161063032"/>
+                    </a:ext>
+                  </a:extLst>
+                </a:gridCol>
+                <a:gridCol w="3914719">
+                  <a:extLst>
+                    <a:ext uri="{9D8B030D-6E8A-4147-A177-3AD203B41FA5}">
+                      <a16:colId xmlns:a16="http://schemas.microsoft.com/office/drawing/2014/main" val="3802548961"/>
+                    </a:ext>
+                  </a:extLst>
+                </a:gridCol>
+              </a:tblGrid>
+              <a:tr h="370840">
+                <a:tc>
+                  <a:txBody>
+                    <a:bodyPr/>
+                    <a:lstStyle/>
+                    <a:p>
+                      <a:r>
+                        <a:rPr lang="en-US" dirty="0"/>
+                        <a:t>Test Case Description</a:t>
+                      </a:r>
+                      <a:endParaRPr lang="en-GB" dirty="0"/>
+                    </a:p>
+                  </a:txBody>
+                  <a:tcPr/>
+                </a:tc>
+                <a:tc>
+                  <a:txBody>
+                    <a:bodyPr/>
+                    <a:lstStyle/>
+                    <a:p>
+                      <a:r>
+                        <a:rPr lang="en-US" dirty="0"/>
+                        <a:t>Paid</a:t>
+                      </a:r>
+                      <a:endParaRPr lang="en-GB" dirty="0"/>
+                    </a:p>
+                  </a:txBody>
+                  <a:tcPr/>
+                </a:tc>
+                <a:tc>
+                  <a:txBody>
+                    <a:bodyPr/>
+                    <a:lstStyle/>
+                    <a:p>
+                      <a:r>
+                        <a:rPr lang="en-US" dirty="0"/>
+                        <a:t>Passes</a:t>
+                      </a:r>
+                      <a:endParaRPr lang="en-GB" dirty="0"/>
+                    </a:p>
+                  </a:txBody>
+                  <a:tcPr/>
+                </a:tc>
+                <a:extLst>
+                  <a:ext uri="{0D108BD9-81ED-4DB2-BD59-A6C34878D82A}">
+                    <a16:rowId xmlns:a16="http://schemas.microsoft.com/office/drawing/2014/main" val="2293430474"/>
+                  </a:ext>
+                </a:extLst>
+              </a:tr>
+              <a:tr h="198120">
+                <a:tc rowSpan="2">
+                  <a:txBody>
+                    <a:bodyPr/>
+                    <a:lstStyle/>
+                    <a:p>
+                      <a:pPr marL="0" marR="0" lvl="0" indent="0" algn="l" defTabSz="914400" rtl="0" eaLnBrk="1" fontAlgn="auto" latinLnBrk="0" hangingPunct="1">
+                        <a:lnSpc>
+                          <a:spcPct val="100000"/>
+                        </a:lnSpc>
+                        <a:spcBef>
+                          <a:spcPts val="0"/>
+                        </a:spcBef>
+                        <a:spcAft>
+                          <a:spcPts val="0"/>
+                        </a:spcAft>
+                        <a:buClrTx/>
+                        <a:buSzTx/>
+                        <a:buFontTx/>
+                        <a:buNone/>
+                        <a:tabLst/>
+                        <a:defRPr/>
+                      </a:pPr>
+                      <a:r>
+                        <a:rPr lang="en-US" sz="1000" dirty="0"/>
+                        <a:t>Test that the user still has access to the info page</a:t>
+                      </a:r>
+                    </a:p>
+                    <a:p>
+                      <a:endParaRPr lang="en-GB" sz="1000" dirty="0"/>
+                    </a:p>
+                  </a:txBody>
+                  <a:tcPr/>
+                </a:tc>
+                <a:tc>
+                  <a:txBody>
+                    <a:bodyPr/>
+                    <a:lstStyle/>
+                    <a:p>
+                      <a:r>
+                        <a:rPr lang="en-US" sz="1000" dirty="0"/>
+                        <a:t>Y</a:t>
+                      </a:r>
+                      <a:endParaRPr lang="en-GB" sz="1000" dirty="0"/>
+                    </a:p>
+                  </a:txBody>
+                  <a:tcPr/>
+                </a:tc>
+                <a:tc>
+                  <a:txBody>
+                    <a:bodyPr/>
+                    <a:lstStyle/>
+                    <a:p>
+                      <a:r>
+                        <a:rPr lang="en-US" sz="1000" dirty="0">
+                          <a:solidFill>
+                            <a:schemeClr val="bg1"/>
+                          </a:solidFill>
+                        </a:rPr>
+                        <a:t>Y</a:t>
+                      </a:r>
+                      <a:endParaRPr lang="en-GB" sz="1000" dirty="0">
+                        <a:solidFill>
+                          <a:schemeClr val="bg1"/>
+                        </a:solidFill>
+                      </a:endParaRPr>
+                    </a:p>
+                  </a:txBody>
+                  <a:tcPr>
+                    <a:solidFill>
+                      <a:srgbClr val="00B050"/>
+                    </a:solidFill>
+                  </a:tcPr>
+                </a:tc>
+                <a:extLst>
+                  <a:ext uri="{0D108BD9-81ED-4DB2-BD59-A6C34878D82A}">
+                    <a16:rowId xmlns:a16="http://schemas.microsoft.com/office/drawing/2014/main" val="4092301472"/>
+                  </a:ext>
+                </a:extLst>
+              </a:tr>
+              <a:tr h="198120">
+                <a:tc vMerge="1">
+                  <a:txBody>
+                    <a:bodyPr/>
+                    <a:lstStyle/>
+                    <a:p>
+                      <a:endParaRPr lang="en-GB"/>
+                    </a:p>
+                  </a:txBody>
+                  <a:tcPr/>
+                </a:tc>
+                <a:tc>
+                  <a:txBody>
+                    <a:bodyPr/>
+                    <a:lstStyle/>
+                    <a:p>
+                      <a:r>
+                        <a:rPr lang="en-US" sz="1000" dirty="0"/>
+                        <a:t>N</a:t>
+                      </a:r>
+                      <a:endParaRPr lang="en-GB" sz="1000" dirty="0"/>
+                    </a:p>
+                  </a:txBody>
+                  <a:tcPr/>
+                </a:tc>
+                <a:tc>
+                  <a:txBody>
+                    <a:bodyPr/>
+                    <a:lstStyle/>
+                    <a:p>
+                      <a:r>
+                        <a:rPr lang="en-US" sz="1000" dirty="0">
+                          <a:solidFill>
+                            <a:schemeClr val="bg1"/>
+                          </a:solidFill>
+                        </a:rPr>
+                        <a:t>Y</a:t>
+                      </a:r>
+                      <a:endParaRPr lang="en-GB" sz="1000" dirty="0">
+                        <a:solidFill>
+                          <a:schemeClr val="bg1"/>
+                        </a:solidFill>
+                      </a:endParaRPr>
+                    </a:p>
+                  </a:txBody>
+                  <a:tcPr>
+                    <a:solidFill>
+                      <a:srgbClr val="00B050"/>
+                    </a:solidFill>
+                  </a:tcPr>
+                </a:tc>
+                <a:extLst>
+                  <a:ext uri="{0D108BD9-81ED-4DB2-BD59-A6C34878D82A}">
+                    <a16:rowId xmlns:a16="http://schemas.microsoft.com/office/drawing/2014/main" val="1518018502"/>
+                  </a:ext>
+                </a:extLst>
+              </a:tr>
+              <a:tr h="198120">
+                <a:tc rowSpan="2">
+                  <a:txBody>
+                    <a:bodyPr/>
+                    <a:lstStyle/>
+                    <a:p>
+                      <a:pPr marL="0" marR="0" lvl="0" indent="0" algn="l" defTabSz="914400" rtl="0" eaLnBrk="1" fontAlgn="auto" latinLnBrk="0" hangingPunct="1">
+                        <a:lnSpc>
+                          <a:spcPct val="100000"/>
+                        </a:lnSpc>
+                        <a:spcBef>
+                          <a:spcPts val="0"/>
+                        </a:spcBef>
+                        <a:spcAft>
+                          <a:spcPts val="0"/>
+                        </a:spcAft>
+                        <a:buClrTx/>
+                        <a:buSzTx/>
+                        <a:buFontTx/>
+                        <a:buNone/>
+                        <a:tabLst/>
+                        <a:defRPr/>
+                      </a:pPr>
+                      <a:r>
+                        <a:rPr lang="en-US" sz="1000" dirty="0"/>
+                        <a:t>Test that the user still has access to the payment page</a:t>
+                      </a:r>
+                    </a:p>
+                    <a:p>
+                      <a:endParaRPr lang="en-GB" sz="1000" dirty="0"/>
+                    </a:p>
+                  </a:txBody>
+                  <a:tcPr/>
+                </a:tc>
+                <a:tc>
+                  <a:txBody>
+                    <a:bodyPr/>
+                    <a:lstStyle/>
+                    <a:p>
+                      <a:r>
+                        <a:rPr lang="en-US" sz="1000" dirty="0"/>
+                        <a:t>Y</a:t>
+                      </a:r>
+                    </a:p>
+                  </a:txBody>
+                  <a:tcPr/>
+                </a:tc>
+                <a:tc>
+                  <a:txBody>
+                    <a:bodyPr/>
+                    <a:lstStyle/>
+                    <a:p>
+                      <a:r>
+                        <a:rPr lang="en-US" sz="1000" dirty="0">
+                          <a:solidFill>
+                            <a:schemeClr val="bg1"/>
+                          </a:solidFill>
+                        </a:rPr>
+                        <a:t>Y</a:t>
+                      </a:r>
+                      <a:endParaRPr lang="en-GB" sz="1000" dirty="0">
+                        <a:solidFill>
+                          <a:schemeClr val="bg1"/>
+                        </a:solidFill>
+                      </a:endParaRPr>
+                    </a:p>
+                  </a:txBody>
+                  <a:tcPr>
+                    <a:solidFill>
+                      <a:srgbClr val="00B050"/>
+                    </a:solidFill>
+                  </a:tcPr>
+                </a:tc>
+                <a:extLst>
+                  <a:ext uri="{0D108BD9-81ED-4DB2-BD59-A6C34878D82A}">
+                    <a16:rowId xmlns:a16="http://schemas.microsoft.com/office/drawing/2014/main" val="328919621"/>
+                  </a:ext>
+                </a:extLst>
+              </a:tr>
+              <a:tr h="198120">
+                <a:tc vMerge="1">
+                  <a:txBody>
+                    <a:bodyPr/>
+                    <a:lstStyle/>
+                    <a:p>
+                      <a:endParaRPr lang="en-GB"/>
+                    </a:p>
+                  </a:txBody>
+                  <a:tcPr/>
+                </a:tc>
+                <a:tc>
+                  <a:txBody>
+                    <a:bodyPr/>
+                    <a:lstStyle/>
+                    <a:p>
+                      <a:r>
+                        <a:rPr lang="en-US" sz="1000" dirty="0"/>
+                        <a:t>N</a:t>
+                      </a:r>
+                      <a:endParaRPr lang="en-GB" sz="1000" dirty="0"/>
+                    </a:p>
+                  </a:txBody>
+                  <a:tcPr/>
+                </a:tc>
+                <a:tc>
+                  <a:txBody>
+                    <a:bodyPr/>
+                    <a:lstStyle/>
+                    <a:p>
+                      <a:r>
+                        <a:rPr lang="en-US" sz="1000" dirty="0">
+                          <a:solidFill>
+                            <a:schemeClr val="bg1"/>
+                          </a:solidFill>
+                        </a:rPr>
+                        <a:t>Y</a:t>
+                      </a:r>
+                      <a:endParaRPr lang="en-GB" sz="1000" dirty="0">
+                        <a:solidFill>
+                          <a:schemeClr val="bg1"/>
+                        </a:solidFill>
+                      </a:endParaRPr>
+                    </a:p>
+                  </a:txBody>
+                  <a:tcPr>
+                    <a:solidFill>
+                      <a:srgbClr val="00B050"/>
+                    </a:solidFill>
+                  </a:tcPr>
+                </a:tc>
+                <a:extLst>
+                  <a:ext uri="{0D108BD9-81ED-4DB2-BD59-A6C34878D82A}">
+                    <a16:rowId xmlns:a16="http://schemas.microsoft.com/office/drawing/2014/main" val="3300413503"/>
+                  </a:ext>
+                </a:extLst>
+              </a:tr>
+              <a:tr h="198120">
+                <a:tc rowSpan="2">
+                  <a:txBody>
+                    <a:bodyPr/>
+                    <a:lstStyle/>
+                    <a:p>
+                      <a:pPr marL="0" marR="0" lvl="0" indent="0" algn="l" defTabSz="914400" rtl="0" eaLnBrk="1" fontAlgn="auto" latinLnBrk="0" hangingPunct="1">
+                        <a:lnSpc>
+                          <a:spcPct val="100000"/>
+                        </a:lnSpc>
+                        <a:spcBef>
+                          <a:spcPts val="0"/>
+                        </a:spcBef>
+                        <a:spcAft>
+                          <a:spcPts val="0"/>
+                        </a:spcAft>
+                        <a:buClrTx/>
+                        <a:buSzTx/>
+                        <a:buFontTx/>
+                        <a:buNone/>
+                        <a:tabLst/>
+                        <a:defRPr/>
+                      </a:pPr>
+                      <a:r>
+                        <a:rPr lang="en-US" sz="1000" dirty="0"/>
+                        <a:t>Test that the user does not have access to the ticket menu for non-payers and they do have access if payers</a:t>
+                      </a:r>
+                    </a:p>
+                    <a:p>
+                      <a:endParaRPr lang="en-GB" sz="1000" dirty="0"/>
+                    </a:p>
+                  </a:txBody>
+                  <a:tcPr/>
+                </a:tc>
+                <a:tc>
+                  <a:txBody>
+                    <a:bodyPr/>
+                    <a:lstStyle/>
+                    <a:p>
+                      <a:r>
+                        <a:rPr lang="en-US" sz="1000" dirty="0"/>
+                        <a:t>Y</a:t>
+                      </a:r>
+                      <a:endParaRPr lang="en-GB" sz="1000" dirty="0"/>
+                    </a:p>
+                  </a:txBody>
+                  <a:tcPr/>
+                </a:tc>
+                <a:tc>
+                  <a:txBody>
+                    <a:bodyPr/>
+                    <a:lstStyle/>
+                    <a:p>
+                      <a:r>
+                        <a:rPr lang="en-US" sz="1000" dirty="0">
+                          <a:solidFill>
+                            <a:schemeClr val="bg1"/>
+                          </a:solidFill>
+                        </a:rPr>
+                        <a:t>Y</a:t>
+                      </a:r>
+                      <a:endParaRPr lang="en-GB" sz="1000" dirty="0">
+                        <a:solidFill>
+                          <a:schemeClr val="bg1"/>
+                        </a:solidFill>
+                      </a:endParaRPr>
+                    </a:p>
+                  </a:txBody>
+                  <a:tcPr>
+                    <a:solidFill>
+                      <a:srgbClr val="00B050"/>
+                    </a:solidFill>
+                  </a:tcPr>
+                </a:tc>
+                <a:extLst>
+                  <a:ext uri="{0D108BD9-81ED-4DB2-BD59-A6C34878D82A}">
+                    <a16:rowId xmlns:a16="http://schemas.microsoft.com/office/drawing/2014/main" val="966653664"/>
+                  </a:ext>
+                </a:extLst>
+              </a:tr>
+              <a:tr h="198120">
+                <a:tc vMerge="1">
+                  <a:txBody>
+                    <a:bodyPr/>
+                    <a:lstStyle/>
+                    <a:p>
+                      <a:endParaRPr lang="en-GB"/>
+                    </a:p>
+                  </a:txBody>
+                  <a:tcPr/>
+                </a:tc>
+                <a:tc>
+                  <a:txBody>
+                    <a:bodyPr/>
+                    <a:lstStyle/>
+                    <a:p>
+                      <a:r>
+                        <a:rPr lang="en-US" sz="1000" dirty="0"/>
+                        <a:t>N</a:t>
+                      </a:r>
+                      <a:endParaRPr lang="en-GB" sz="1000" dirty="0"/>
+                    </a:p>
+                  </a:txBody>
+                  <a:tcPr/>
+                </a:tc>
+                <a:tc>
+                  <a:txBody>
+                    <a:bodyPr/>
+                    <a:lstStyle/>
+                    <a:p>
+                      <a:r>
+                        <a:rPr lang="en-US" sz="1000" dirty="0">
+                          <a:solidFill>
+                            <a:schemeClr val="bg1"/>
+                          </a:solidFill>
+                        </a:rPr>
+                        <a:t>Y</a:t>
+                      </a:r>
+                      <a:endParaRPr lang="en-GB" sz="1000" dirty="0">
+                        <a:solidFill>
+                          <a:schemeClr val="bg1"/>
+                        </a:solidFill>
+                      </a:endParaRPr>
+                    </a:p>
+                  </a:txBody>
+                  <a:tcPr>
+                    <a:solidFill>
+                      <a:srgbClr val="00B050"/>
+                    </a:solidFill>
+                  </a:tcPr>
+                </a:tc>
+                <a:extLst>
+                  <a:ext uri="{0D108BD9-81ED-4DB2-BD59-A6C34878D82A}">
+                    <a16:rowId xmlns:a16="http://schemas.microsoft.com/office/drawing/2014/main" val="436329769"/>
+                  </a:ext>
+                </a:extLst>
+              </a:tr>
+              <a:tr h="198120">
+                <a:tc rowSpan="2">
+                  <a:txBody>
+                    <a:bodyPr/>
+                    <a:lstStyle/>
+                    <a:p>
+                      <a:pPr marL="0" marR="0" lvl="0" indent="0" algn="l" defTabSz="914400" rtl="0" eaLnBrk="1" fontAlgn="auto" latinLnBrk="0" hangingPunct="1">
+                        <a:lnSpc>
+                          <a:spcPct val="100000"/>
+                        </a:lnSpc>
+                        <a:spcBef>
+                          <a:spcPts val="0"/>
+                        </a:spcBef>
+                        <a:spcAft>
+                          <a:spcPts val="0"/>
+                        </a:spcAft>
+                        <a:buClrTx/>
+                        <a:buSzTx/>
+                        <a:buFontTx/>
+                        <a:buNone/>
+                        <a:tabLst/>
+                        <a:defRPr/>
+                      </a:pPr>
+                      <a:r>
+                        <a:rPr lang="en-US" sz="1000" dirty="0"/>
+                        <a:t>Test that the user does not have access to display a ticket if non-payer else they do have access</a:t>
+                      </a:r>
+                    </a:p>
+                    <a:p>
+                      <a:endParaRPr lang="en-GB" sz="1000" dirty="0"/>
+                    </a:p>
+                  </a:txBody>
+                  <a:tcPr/>
+                </a:tc>
+                <a:tc>
+                  <a:txBody>
+                    <a:bodyPr/>
+                    <a:lstStyle/>
+                    <a:p>
+                      <a:r>
+                        <a:rPr lang="en-US" sz="1000" dirty="0"/>
+                        <a:t>Y</a:t>
+                      </a:r>
+                      <a:endParaRPr lang="en-GB" sz="1000" dirty="0"/>
+                    </a:p>
+                  </a:txBody>
+                  <a:tcPr/>
+                </a:tc>
+                <a:tc>
+                  <a:txBody>
+                    <a:bodyPr/>
+                    <a:lstStyle/>
+                    <a:p>
+                      <a:r>
+                        <a:rPr lang="en-US" sz="1000" dirty="0">
+                          <a:solidFill>
+                            <a:schemeClr val="bg1"/>
+                          </a:solidFill>
+                        </a:rPr>
+                        <a:t>Y</a:t>
+                      </a:r>
+                      <a:endParaRPr lang="en-GB" sz="1000" dirty="0">
+                        <a:solidFill>
+                          <a:schemeClr val="bg1"/>
+                        </a:solidFill>
+                      </a:endParaRPr>
+                    </a:p>
+                  </a:txBody>
+                  <a:tcPr>
+                    <a:solidFill>
+                      <a:srgbClr val="00B050"/>
+                    </a:solidFill>
+                  </a:tcPr>
+                </a:tc>
+                <a:extLst>
+                  <a:ext uri="{0D108BD9-81ED-4DB2-BD59-A6C34878D82A}">
+                    <a16:rowId xmlns:a16="http://schemas.microsoft.com/office/drawing/2014/main" val="2350835260"/>
+                  </a:ext>
+                </a:extLst>
+              </a:tr>
+              <a:tr h="198120">
+                <a:tc vMerge="1">
+                  <a:txBody>
+                    <a:bodyPr/>
+                    <a:lstStyle/>
+                    <a:p>
+                      <a:endParaRPr lang="en-GB"/>
+                    </a:p>
+                  </a:txBody>
+                  <a:tcPr/>
+                </a:tc>
+                <a:tc>
+                  <a:txBody>
+                    <a:bodyPr/>
+                    <a:lstStyle/>
+                    <a:p>
+                      <a:r>
+                        <a:rPr lang="en-US" sz="1000" dirty="0"/>
+                        <a:t>N</a:t>
+                      </a:r>
+                      <a:endParaRPr lang="en-GB" sz="1000" dirty="0"/>
+                    </a:p>
+                  </a:txBody>
+                  <a:tcPr/>
+                </a:tc>
+                <a:tc>
+                  <a:txBody>
+                    <a:bodyPr/>
+                    <a:lstStyle/>
+                    <a:p>
+                      <a:r>
+                        <a:rPr lang="en-US" sz="1000" dirty="0">
+                          <a:solidFill>
+                            <a:schemeClr val="bg1"/>
+                          </a:solidFill>
+                        </a:rPr>
+                        <a:t>Y</a:t>
+                      </a:r>
+                      <a:endParaRPr lang="en-GB" sz="1000" dirty="0">
+                        <a:solidFill>
+                          <a:schemeClr val="bg1"/>
+                        </a:solidFill>
+                      </a:endParaRPr>
+                    </a:p>
+                  </a:txBody>
+                  <a:tcPr>
+                    <a:solidFill>
+                      <a:srgbClr val="00B050"/>
+                    </a:solidFill>
+                  </a:tcPr>
+                </a:tc>
+                <a:extLst>
+                  <a:ext uri="{0D108BD9-81ED-4DB2-BD59-A6C34878D82A}">
+                    <a16:rowId xmlns:a16="http://schemas.microsoft.com/office/drawing/2014/main" val="2599820239"/>
+                  </a:ext>
+                </a:extLst>
+              </a:tr>
+              <a:tr h="198120">
+                <a:tc rowSpan="2">
+                  <a:txBody>
+                    <a:bodyPr/>
+                    <a:lstStyle/>
+                    <a:p>
+                      <a:pPr marL="0" marR="0" lvl="0" indent="0" algn="l" defTabSz="914400" rtl="0" eaLnBrk="1" fontAlgn="auto" latinLnBrk="0" hangingPunct="1">
+                        <a:lnSpc>
+                          <a:spcPct val="100000"/>
+                        </a:lnSpc>
+                        <a:spcBef>
+                          <a:spcPts val="0"/>
+                        </a:spcBef>
+                        <a:spcAft>
+                          <a:spcPts val="0"/>
+                        </a:spcAft>
+                        <a:buClrTx/>
+                        <a:buSzTx/>
+                        <a:buFontTx/>
+                        <a:buNone/>
+                        <a:tabLst/>
+                        <a:defRPr/>
+                      </a:pPr>
+                      <a:r>
+                        <a:rPr lang="en-US" sz="1000" dirty="0"/>
+                        <a:t>Test that the code was not fetched if non payer but the code is fetched if they have paid</a:t>
+                      </a:r>
+                      <a:endParaRPr lang="en-GB" sz="1000" dirty="0"/>
+                    </a:p>
+                    <a:p>
+                      <a:endParaRPr lang="en-GB" sz="1000" dirty="0"/>
+                    </a:p>
+                  </a:txBody>
+                  <a:tcPr/>
+                </a:tc>
+                <a:tc>
+                  <a:txBody>
+                    <a:bodyPr/>
+                    <a:lstStyle/>
+                    <a:p>
+                      <a:r>
+                        <a:rPr lang="en-US" sz="1000" dirty="0"/>
+                        <a:t>Y</a:t>
+                      </a:r>
+                      <a:endParaRPr lang="en-GB" sz="1000" dirty="0"/>
+                    </a:p>
+                  </a:txBody>
+                  <a:tcPr/>
+                </a:tc>
+                <a:tc>
+                  <a:txBody>
+                    <a:bodyPr/>
+                    <a:lstStyle/>
+                    <a:p>
+                      <a:r>
+                        <a:rPr lang="en-US" sz="1000" dirty="0">
+                          <a:solidFill>
+                            <a:schemeClr val="bg1"/>
+                          </a:solidFill>
+                        </a:rPr>
+                        <a:t>Y</a:t>
+                      </a:r>
+                      <a:endParaRPr lang="en-GB" sz="1000" dirty="0">
+                        <a:solidFill>
+                          <a:schemeClr val="bg1"/>
+                        </a:solidFill>
+                      </a:endParaRPr>
+                    </a:p>
+                  </a:txBody>
+                  <a:tcPr>
+                    <a:solidFill>
+                      <a:srgbClr val="00B050"/>
+                    </a:solidFill>
+                  </a:tcPr>
+                </a:tc>
+                <a:extLst>
+                  <a:ext uri="{0D108BD9-81ED-4DB2-BD59-A6C34878D82A}">
+                    <a16:rowId xmlns:a16="http://schemas.microsoft.com/office/drawing/2014/main" val="2481358409"/>
+                  </a:ext>
+                </a:extLst>
+              </a:tr>
+              <a:tr h="198120">
+                <a:tc vMerge="1">
+                  <a:txBody>
+                    <a:bodyPr/>
+                    <a:lstStyle/>
+                    <a:p>
+                      <a:endParaRPr lang="en-GB"/>
+                    </a:p>
+                  </a:txBody>
+                  <a:tcPr/>
+                </a:tc>
+                <a:tc>
+                  <a:txBody>
+                    <a:bodyPr/>
+                    <a:lstStyle/>
+                    <a:p>
+                      <a:r>
+                        <a:rPr lang="en-US" sz="1000" dirty="0"/>
+                        <a:t>N</a:t>
+                      </a:r>
+                      <a:endParaRPr lang="en-GB" sz="1000" dirty="0"/>
+                    </a:p>
+                  </a:txBody>
+                  <a:tcPr/>
+                </a:tc>
+                <a:tc>
+                  <a:txBody>
+                    <a:bodyPr/>
+                    <a:lstStyle/>
+                    <a:p>
+                      <a:r>
+                        <a:rPr lang="en-US" sz="1000" dirty="0">
+                          <a:solidFill>
+                            <a:schemeClr val="bg1"/>
+                          </a:solidFill>
+                        </a:rPr>
+                        <a:t>Y</a:t>
+                      </a:r>
+                      <a:endParaRPr lang="en-GB" sz="1000" dirty="0">
+                        <a:solidFill>
+                          <a:schemeClr val="bg1"/>
+                        </a:solidFill>
+                      </a:endParaRPr>
+                    </a:p>
+                  </a:txBody>
+                  <a:tcPr>
+                    <a:solidFill>
+                      <a:srgbClr val="00B050"/>
+                    </a:solidFill>
+                  </a:tcPr>
+                </a:tc>
+                <a:extLst>
+                  <a:ext uri="{0D108BD9-81ED-4DB2-BD59-A6C34878D82A}">
+                    <a16:rowId xmlns:a16="http://schemas.microsoft.com/office/drawing/2014/main" val="175723742"/>
+                  </a:ext>
+                </a:extLst>
+              </a:tr>
+            </a:tbl>
+          </a:graphicData>
+        </a:graphic>
+      </p:graphicFrame>
     </p:spTree>
     <p:extLst>
       <p:ext uri="{BB962C8B-B14F-4D97-AF65-F5344CB8AC3E}">

</xml_diff>